<commit_message>
Nuevos ejercicios y servicio contra servicio
</commit_message>
<xml_diff>
--- a/pizarra.pptx
+++ b/pizarra.pptx
@@ -12,6 +12,11 @@
     <p:sldId id="260" r:id="rId6"/>
     <p:sldId id="261" r:id="rId7"/>
     <p:sldId id="262" r:id="rId8"/>
+    <p:sldId id="263" r:id="rId9"/>
+    <p:sldId id="264" r:id="rId10"/>
+    <p:sldId id="265" r:id="rId11"/>
+    <p:sldId id="266" r:id="rId12"/>
+    <p:sldId id="267" r:id="rId13"/>
   </p:sldIdLst>
   <p:sldSz cx="9144000" cy="6858000" type="screen4x3"/>
   <p:notesSz cx="6858000" cy="9144000"/>
@@ -295,7 +300,7 @@
             <a:fld id="{7A847CFC-816F-41D0-AAC0-9BF4FEBC753E}" type="datetimeFigureOut">
               <a:rPr lang="es-ES" smtClean="0"/>
               <a:pPr/>
-              <a:t>27/05/2025</a:t>
+              <a:t>09/06/2025</a:t>
             </a:fld>
             <a:endParaRPr lang="es-ES"/>
           </a:p>
@@ -462,7 +467,7 @@
             <a:fld id="{7A847CFC-816F-41D0-AAC0-9BF4FEBC753E}" type="datetimeFigureOut">
               <a:rPr lang="es-ES" smtClean="0"/>
               <a:pPr/>
-              <a:t>27/05/2025</a:t>
+              <a:t>09/06/2025</a:t>
             </a:fld>
             <a:endParaRPr lang="es-ES"/>
           </a:p>
@@ -639,7 +644,7 @@
             <a:fld id="{7A847CFC-816F-41D0-AAC0-9BF4FEBC753E}" type="datetimeFigureOut">
               <a:rPr lang="es-ES" smtClean="0"/>
               <a:pPr/>
-              <a:t>27/05/2025</a:t>
+              <a:t>09/06/2025</a:t>
             </a:fld>
             <a:endParaRPr lang="es-ES"/>
           </a:p>
@@ -806,7 +811,7 @@
             <a:fld id="{7A847CFC-816F-41D0-AAC0-9BF4FEBC753E}" type="datetimeFigureOut">
               <a:rPr lang="es-ES" smtClean="0"/>
               <a:pPr/>
-              <a:t>27/05/2025</a:t>
+              <a:t>09/06/2025</a:t>
             </a:fld>
             <a:endParaRPr lang="es-ES"/>
           </a:p>
@@ -1049,7 +1054,7 @@
             <a:fld id="{7A847CFC-816F-41D0-AAC0-9BF4FEBC753E}" type="datetimeFigureOut">
               <a:rPr lang="es-ES" smtClean="0"/>
               <a:pPr/>
-              <a:t>27/05/2025</a:t>
+              <a:t>09/06/2025</a:t>
             </a:fld>
             <a:endParaRPr lang="es-ES"/>
           </a:p>
@@ -1334,7 +1339,7 @@
             <a:fld id="{7A847CFC-816F-41D0-AAC0-9BF4FEBC753E}" type="datetimeFigureOut">
               <a:rPr lang="es-ES" smtClean="0"/>
               <a:pPr/>
-              <a:t>27/05/2025</a:t>
+              <a:t>09/06/2025</a:t>
             </a:fld>
             <a:endParaRPr lang="es-ES"/>
           </a:p>
@@ -1753,7 +1758,7 @@
             <a:fld id="{7A847CFC-816F-41D0-AAC0-9BF4FEBC753E}" type="datetimeFigureOut">
               <a:rPr lang="es-ES" smtClean="0"/>
               <a:pPr/>
-              <a:t>27/05/2025</a:t>
+              <a:t>09/06/2025</a:t>
             </a:fld>
             <a:endParaRPr lang="es-ES"/>
           </a:p>
@@ -1868,7 +1873,7 @@
             <a:fld id="{7A847CFC-816F-41D0-AAC0-9BF4FEBC753E}" type="datetimeFigureOut">
               <a:rPr lang="es-ES" smtClean="0"/>
               <a:pPr/>
-              <a:t>27/05/2025</a:t>
+              <a:t>09/06/2025</a:t>
             </a:fld>
             <a:endParaRPr lang="es-ES"/>
           </a:p>
@@ -1960,7 +1965,7 @@
             <a:fld id="{7A847CFC-816F-41D0-AAC0-9BF4FEBC753E}" type="datetimeFigureOut">
               <a:rPr lang="es-ES" smtClean="0"/>
               <a:pPr/>
-              <a:t>27/05/2025</a:t>
+              <a:t>09/06/2025</a:t>
             </a:fld>
             <a:endParaRPr lang="es-ES"/>
           </a:p>
@@ -2234,7 +2239,7 @@
             <a:fld id="{7A847CFC-816F-41D0-AAC0-9BF4FEBC753E}" type="datetimeFigureOut">
               <a:rPr lang="es-ES" smtClean="0"/>
               <a:pPr/>
-              <a:t>27/05/2025</a:t>
+              <a:t>09/06/2025</a:t>
             </a:fld>
             <a:endParaRPr lang="es-ES"/>
           </a:p>
@@ -2484,7 +2489,7 @@
             <a:fld id="{7A847CFC-816F-41D0-AAC0-9BF4FEBC753E}" type="datetimeFigureOut">
               <a:rPr lang="es-ES" smtClean="0"/>
               <a:pPr/>
-              <a:t>27/05/2025</a:t>
+              <a:t>09/06/2025</a:t>
             </a:fld>
             <a:endParaRPr lang="es-ES"/>
           </a:p>
@@ -2694,7 +2699,7 @@
             <a:fld id="{7A847CFC-816F-41D0-AAC0-9BF4FEBC753E}" type="datetimeFigureOut">
               <a:rPr lang="es-ES" smtClean="0"/>
               <a:pPr/>
-              <a:t>27/05/2025</a:t>
+              <a:t>09/06/2025</a:t>
             </a:fld>
             <a:endParaRPr lang="es-ES"/>
           </a:p>
@@ -3223,6 +3228,881 @@
 </p:sld>
 </file>
 
+<file path=ppt/slides/slide10.xml><?xml version="1.0" encoding="utf-8"?>
+<p:sld xmlns:a="http://schemas.openxmlformats.org/drawingml/2006/main" xmlns:r="http://schemas.openxmlformats.org/officeDocument/2006/relationships" xmlns:p="http://schemas.openxmlformats.org/presentationml/2006/main">
+  <p:cSld>
+    <p:spTree>
+      <p:nvGrpSpPr>
+        <p:cNvPr id="1" name=""/>
+        <p:cNvGrpSpPr/>
+        <p:nvPr/>
+      </p:nvGrpSpPr>
+      <p:grpSpPr>
+        <a:xfrm>
+          <a:off x="0" y="0"/>
+          <a:ext cx="0" cy="0"/>
+          <a:chOff x="0" y="0"/>
+          <a:chExt cx="0" cy="0"/>
+        </a:xfrm>
+      </p:grpSpPr>
+      <p:sp>
+        <p:nvSpPr>
+          <p:cNvPr id="2" name="1 CuadroTexto"/>
+          <p:cNvSpPr txBox="1"/>
+          <p:nvPr/>
+        </p:nvSpPr>
+        <p:spPr>
+          <a:xfrm>
+            <a:off x="395536" y="620688"/>
+            <a:ext cx="4104456" cy="369332"/>
+          </a:xfrm>
+          <a:prstGeom prst="rect">
+            <a:avLst/>
+          </a:prstGeom>
+          <a:noFill/>
+        </p:spPr>
+        <p:txBody>
+          <a:bodyPr wrap="square" rtlCol="0">
+            <a:spAutoFit/>
+          </a:bodyPr>
+          <a:lstStyle/>
+          <a:p>
+            <a:r>
+              <a:rPr lang="es-ES" dirty="0" smtClean="0"/>
+              <a:t>-Alta de nuevos cursos</a:t>
+            </a:r>
+            <a:endParaRPr lang="es-ES" dirty="0"/>
+          </a:p>
+        </p:txBody>
+      </p:sp>
+      <p:sp>
+        <p:nvSpPr>
+          <p:cNvPr id="3" name="2 CuadroTexto"/>
+          <p:cNvSpPr txBox="1"/>
+          <p:nvPr/>
+        </p:nvSpPr>
+        <p:spPr>
+          <a:xfrm>
+            <a:off x="467544" y="1988840"/>
+            <a:ext cx="7632848" cy="1477328"/>
+          </a:xfrm>
+          <a:prstGeom prst="rect">
+            <a:avLst/>
+          </a:prstGeom>
+          <a:noFill/>
+        </p:spPr>
+        <p:txBody>
+          <a:bodyPr wrap="square" rtlCol="0">
+            <a:spAutoFit/>
+          </a:bodyPr>
+          <a:lstStyle/>
+          <a:p>
+            <a:r>
+              <a:rPr lang="es-ES" dirty="0" smtClean="0"/>
+              <a:t>Alta de nuevos alumnos:</a:t>
+            </a:r>
+          </a:p>
+          <a:p>
+            <a:r>
+              <a:rPr lang="es-ES" dirty="0" smtClean="0"/>
+              <a:t>	-Usuario y contraseña requeridos</a:t>
+            </a:r>
+          </a:p>
+          <a:p>
+            <a:r>
+              <a:rPr lang="es-ES" dirty="0" smtClean="0"/>
+              <a:t>	-Contraseña mínimo 6 caracteres</a:t>
+            </a:r>
+          </a:p>
+          <a:p>
+            <a:r>
+              <a:rPr lang="es-ES" dirty="0" smtClean="0"/>
+              <a:t>	-Email válido</a:t>
+            </a:r>
+          </a:p>
+          <a:p>
+            <a:r>
+              <a:rPr lang="es-ES" dirty="0" smtClean="0"/>
+              <a:t>	-Edad entre 18 y 99</a:t>
+            </a:r>
+            <a:endParaRPr lang="es-ES" dirty="0"/>
+          </a:p>
+        </p:txBody>
+      </p:sp>
+    </p:spTree>
+  </p:cSld>
+  <p:clrMapOvr>
+    <a:masterClrMapping/>
+  </p:clrMapOvr>
+</p:sld>
+</file>
+
+<file path=ppt/slides/slide11.xml><?xml version="1.0" encoding="utf-8"?>
+<p:sld xmlns:a="http://schemas.openxmlformats.org/drawingml/2006/main" xmlns:r="http://schemas.openxmlformats.org/officeDocument/2006/relationships" xmlns:p="http://schemas.openxmlformats.org/presentationml/2006/main">
+  <p:cSld>
+    <p:spTree>
+      <p:nvGrpSpPr>
+        <p:cNvPr id="1" name=""/>
+        <p:cNvGrpSpPr/>
+        <p:nvPr/>
+      </p:nvGrpSpPr>
+      <p:grpSpPr>
+        <a:xfrm>
+          <a:off x="0" y="0"/>
+          <a:ext cx="0" cy="0"/>
+          <a:chOff x="0" y="0"/>
+          <a:chExt cx="0" cy="0"/>
+        </a:xfrm>
+      </p:grpSpPr>
+      <p:sp>
+        <p:nvSpPr>
+          <p:cNvPr id="2" name="1 Rectángulo"/>
+          <p:cNvSpPr/>
+          <p:nvPr/>
+        </p:nvSpPr>
+        <p:spPr>
+          <a:xfrm>
+            <a:off x="1043608" y="1412776"/>
+            <a:ext cx="6840760" cy="3528392"/>
+          </a:xfrm>
+          <a:prstGeom prst="rect">
+            <a:avLst/>
+          </a:prstGeom>
+          <a:noFill/>
+        </p:spPr>
+        <p:style>
+          <a:lnRef idx="2">
+            <a:schemeClr val="accent1">
+              <a:shade val="50000"/>
+            </a:schemeClr>
+          </a:lnRef>
+          <a:fillRef idx="1">
+            <a:schemeClr val="accent1"/>
+          </a:fillRef>
+          <a:effectRef idx="0">
+            <a:schemeClr val="accent1"/>
+          </a:effectRef>
+          <a:fontRef idx="minor">
+            <a:schemeClr val="lt1"/>
+          </a:fontRef>
+        </p:style>
+        <p:txBody>
+          <a:bodyPr rtlCol="0" anchor="ctr"/>
+          <a:lstStyle/>
+          <a:p>
+            <a:pPr algn="ctr"/>
+            <a:endParaRPr lang="es-ES"/>
+          </a:p>
+        </p:txBody>
+      </p:sp>
+      <p:sp>
+        <p:nvSpPr>
+          <p:cNvPr id="3" name="2 Rectángulo"/>
+          <p:cNvSpPr/>
+          <p:nvPr/>
+        </p:nvSpPr>
+        <p:spPr>
+          <a:xfrm>
+            <a:off x="2771800" y="1844824"/>
+            <a:ext cx="1872208" cy="288032"/>
+          </a:xfrm>
+          <a:prstGeom prst="rect">
+            <a:avLst/>
+          </a:prstGeom>
+        </p:spPr>
+        <p:style>
+          <a:lnRef idx="2">
+            <a:schemeClr val="accent1">
+              <a:shade val="50000"/>
+            </a:schemeClr>
+          </a:lnRef>
+          <a:fillRef idx="1">
+            <a:schemeClr val="accent1"/>
+          </a:fillRef>
+          <a:effectRef idx="0">
+            <a:schemeClr val="accent1"/>
+          </a:effectRef>
+          <a:fontRef idx="minor">
+            <a:schemeClr val="lt1"/>
+          </a:fontRef>
+        </p:style>
+        <p:txBody>
+          <a:bodyPr rtlCol="0" anchor="ctr"/>
+          <a:lstStyle/>
+          <a:p>
+            <a:pPr algn="ctr"/>
+            <a:endParaRPr lang="es-ES"/>
+          </a:p>
+        </p:txBody>
+      </p:sp>
+      <p:cxnSp>
+        <p:nvCxnSpPr>
+          <p:cNvPr id="5" name="4 Conector recto de flecha"/>
+          <p:cNvCxnSpPr/>
+          <p:nvPr/>
+        </p:nvCxnSpPr>
+        <p:spPr>
+          <a:xfrm>
+            <a:off x="4788024" y="1844824"/>
+            <a:ext cx="0" cy="288032"/>
+          </a:xfrm>
+          <a:prstGeom prst="straightConnector1">
+            <a:avLst/>
+          </a:prstGeom>
+          <a:ln w="50800">
+            <a:tailEnd type="arrow"/>
+          </a:ln>
+        </p:spPr>
+        <p:style>
+          <a:lnRef idx="1">
+            <a:schemeClr val="accent1"/>
+          </a:lnRef>
+          <a:fillRef idx="0">
+            <a:schemeClr val="accent1"/>
+          </a:fillRef>
+          <a:effectRef idx="0">
+            <a:schemeClr val="accent1"/>
+          </a:effectRef>
+          <a:fontRef idx="minor">
+            <a:schemeClr val="tx1"/>
+          </a:fontRef>
+        </p:style>
+      </p:cxnSp>
+      <p:sp>
+        <p:nvSpPr>
+          <p:cNvPr id="6" name="5 CuadroTexto"/>
+          <p:cNvSpPr txBox="1"/>
+          <p:nvPr/>
+        </p:nvSpPr>
+        <p:spPr>
+          <a:xfrm>
+            <a:off x="2771800" y="1484784"/>
+            <a:ext cx="2376264" cy="369332"/>
+          </a:xfrm>
+          <a:prstGeom prst="rect">
+            <a:avLst/>
+          </a:prstGeom>
+          <a:noFill/>
+        </p:spPr>
+        <p:txBody>
+          <a:bodyPr wrap="square" rtlCol="0">
+            <a:spAutoFit/>
+          </a:bodyPr>
+          <a:lstStyle/>
+          <a:p>
+            <a:r>
+              <a:rPr lang="es-ES" dirty="0" smtClean="0"/>
+              <a:t>Seleccione curso:</a:t>
+            </a:r>
+            <a:endParaRPr lang="es-ES" dirty="0"/>
+          </a:p>
+        </p:txBody>
+      </p:sp>
+      <p:sp>
+        <p:nvSpPr>
+          <p:cNvPr id="7" name="6 Rectángulo"/>
+          <p:cNvSpPr/>
+          <p:nvPr/>
+        </p:nvSpPr>
+        <p:spPr>
+          <a:xfrm>
+            <a:off x="1691680" y="2780928"/>
+            <a:ext cx="4608512" cy="1656184"/>
+          </a:xfrm>
+          <a:prstGeom prst="rect">
+            <a:avLst/>
+          </a:prstGeom>
+          <a:noFill/>
+        </p:spPr>
+        <p:style>
+          <a:lnRef idx="2">
+            <a:schemeClr val="accent1">
+              <a:shade val="50000"/>
+            </a:schemeClr>
+          </a:lnRef>
+          <a:fillRef idx="1">
+            <a:schemeClr val="accent1"/>
+          </a:fillRef>
+          <a:effectRef idx="0">
+            <a:schemeClr val="accent1"/>
+          </a:effectRef>
+          <a:fontRef idx="minor">
+            <a:schemeClr val="lt1"/>
+          </a:fontRef>
+        </p:style>
+        <p:txBody>
+          <a:bodyPr rtlCol="0" anchor="ctr"/>
+          <a:lstStyle/>
+          <a:p>
+            <a:pPr algn="ctr"/>
+            <a:endParaRPr lang="es-ES"/>
+          </a:p>
+        </p:txBody>
+      </p:sp>
+      <p:sp>
+        <p:nvSpPr>
+          <p:cNvPr id="8" name="7 CuadroTexto"/>
+          <p:cNvSpPr txBox="1"/>
+          <p:nvPr/>
+        </p:nvSpPr>
+        <p:spPr>
+          <a:xfrm>
+            <a:off x="1763688" y="2852936"/>
+            <a:ext cx="1080120" cy="369332"/>
+          </a:xfrm>
+          <a:prstGeom prst="rect">
+            <a:avLst/>
+          </a:prstGeom>
+          <a:noFill/>
+        </p:spPr>
+        <p:txBody>
+          <a:bodyPr wrap="square" rtlCol="0">
+            <a:spAutoFit/>
+          </a:bodyPr>
+          <a:lstStyle/>
+          <a:p>
+            <a:r>
+              <a:rPr lang="es-ES" dirty="0" smtClean="0"/>
+              <a:t>Nombre</a:t>
+            </a:r>
+            <a:endParaRPr lang="es-ES" dirty="0"/>
+          </a:p>
+        </p:txBody>
+      </p:sp>
+      <p:sp>
+        <p:nvSpPr>
+          <p:cNvPr id="9" name="8 CuadroTexto"/>
+          <p:cNvSpPr txBox="1"/>
+          <p:nvPr/>
+        </p:nvSpPr>
+        <p:spPr>
+          <a:xfrm>
+            <a:off x="3059832" y="2852936"/>
+            <a:ext cx="936104" cy="369332"/>
+          </a:xfrm>
+          <a:prstGeom prst="rect">
+            <a:avLst/>
+          </a:prstGeom>
+          <a:noFill/>
+        </p:spPr>
+        <p:txBody>
+          <a:bodyPr wrap="square" rtlCol="0">
+            <a:spAutoFit/>
+          </a:bodyPr>
+          <a:lstStyle/>
+          <a:p>
+            <a:r>
+              <a:rPr lang="es-ES" dirty="0" smtClean="0"/>
+              <a:t>Email</a:t>
+            </a:r>
+            <a:endParaRPr lang="es-ES" dirty="0"/>
+          </a:p>
+        </p:txBody>
+      </p:sp>
+      <p:sp>
+        <p:nvSpPr>
+          <p:cNvPr id="10" name="9 CuadroTexto"/>
+          <p:cNvSpPr txBox="1"/>
+          <p:nvPr/>
+        </p:nvSpPr>
+        <p:spPr>
+          <a:xfrm>
+            <a:off x="4067944" y="2852936"/>
+            <a:ext cx="936104" cy="369332"/>
+          </a:xfrm>
+          <a:prstGeom prst="rect">
+            <a:avLst/>
+          </a:prstGeom>
+          <a:noFill/>
+        </p:spPr>
+        <p:txBody>
+          <a:bodyPr wrap="square" rtlCol="0">
+            <a:spAutoFit/>
+          </a:bodyPr>
+          <a:lstStyle/>
+          <a:p>
+            <a:r>
+              <a:rPr lang="es-ES" dirty="0" smtClean="0"/>
+              <a:t>Curso</a:t>
+            </a:r>
+            <a:endParaRPr lang="es-ES" dirty="0"/>
+          </a:p>
+        </p:txBody>
+      </p:sp>
+      <p:sp>
+        <p:nvSpPr>
+          <p:cNvPr id="11" name="10 CuadroTexto"/>
+          <p:cNvSpPr txBox="1"/>
+          <p:nvPr/>
+        </p:nvSpPr>
+        <p:spPr>
+          <a:xfrm>
+            <a:off x="5148064" y="2852936"/>
+            <a:ext cx="936104" cy="369332"/>
+          </a:xfrm>
+          <a:prstGeom prst="rect">
+            <a:avLst/>
+          </a:prstGeom>
+          <a:noFill/>
+        </p:spPr>
+        <p:txBody>
+          <a:bodyPr wrap="square" rtlCol="0">
+            <a:spAutoFit/>
+          </a:bodyPr>
+          <a:lstStyle/>
+          <a:p>
+            <a:r>
+              <a:rPr lang="es-ES" dirty="0" smtClean="0"/>
+              <a:t>Nota</a:t>
+            </a:r>
+            <a:endParaRPr lang="es-ES" dirty="0"/>
+          </a:p>
+        </p:txBody>
+      </p:sp>
+      <p:cxnSp>
+        <p:nvCxnSpPr>
+          <p:cNvPr id="13" name="12 Conector recto"/>
+          <p:cNvCxnSpPr/>
+          <p:nvPr/>
+        </p:nvCxnSpPr>
+        <p:spPr>
+          <a:xfrm>
+            <a:off x="1691680" y="3212976"/>
+            <a:ext cx="4608512" cy="0"/>
+          </a:xfrm>
+          <a:prstGeom prst="line">
+            <a:avLst/>
+          </a:prstGeom>
+        </p:spPr>
+        <p:style>
+          <a:lnRef idx="1">
+            <a:schemeClr val="accent1"/>
+          </a:lnRef>
+          <a:fillRef idx="0">
+            <a:schemeClr val="accent1"/>
+          </a:fillRef>
+          <a:effectRef idx="0">
+            <a:schemeClr val="accent1"/>
+          </a:effectRef>
+          <a:fontRef idx="minor">
+            <a:schemeClr val="tx1"/>
+          </a:fontRef>
+        </p:style>
+      </p:cxnSp>
+      <p:cxnSp>
+        <p:nvCxnSpPr>
+          <p:cNvPr id="15" name="14 Conector recto"/>
+          <p:cNvCxnSpPr/>
+          <p:nvPr/>
+        </p:nvCxnSpPr>
+        <p:spPr>
+          <a:xfrm>
+            <a:off x="2843808" y="2780928"/>
+            <a:ext cx="0" cy="1656184"/>
+          </a:xfrm>
+          <a:prstGeom prst="line">
+            <a:avLst/>
+          </a:prstGeom>
+        </p:spPr>
+        <p:style>
+          <a:lnRef idx="1">
+            <a:schemeClr val="accent1"/>
+          </a:lnRef>
+          <a:fillRef idx="0">
+            <a:schemeClr val="accent1"/>
+          </a:fillRef>
+          <a:effectRef idx="0">
+            <a:schemeClr val="accent1"/>
+          </a:effectRef>
+          <a:fontRef idx="minor">
+            <a:schemeClr val="tx1"/>
+          </a:fontRef>
+        </p:style>
+      </p:cxnSp>
+      <p:cxnSp>
+        <p:nvCxnSpPr>
+          <p:cNvPr id="16" name="15 Conector recto"/>
+          <p:cNvCxnSpPr/>
+          <p:nvPr/>
+        </p:nvCxnSpPr>
+        <p:spPr>
+          <a:xfrm>
+            <a:off x="3923928" y="2780928"/>
+            <a:ext cx="0" cy="1656184"/>
+          </a:xfrm>
+          <a:prstGeom prst="line">
+            <a:avLst/>
+          </a:prstGeom>
+        </p:spPr>
+        <p:style>
+          <a:lnRef idx="1">
+            <a:schemeClr val="accent1"/>
+          </a:lnRef>
+          <a:fillRef idx="0">
+            <a:schemeClr val="accent1"/>
+          </a:fillRef>
+          <a:effectRef idx="0">
+            <a:schemeClr val="accent1"/>
+          </a:effectRef>
+          <a:fontRef idx="minor">
+            <a:schemeClr val="tx1"/>
+          </a:fontRef>
+        </p:style>
+      </p:cxnSp>
+      <p:cxnSp>
+        <p:nvCxnSpPr>
+          <p:cNvPr id="17" name="16 Conector recto"/>
+          <p:cNvCxnSpPr/>
+          <p:nvPr/>
+        </p:nvCxnSpPr>
+        <p:spPr>
+          <a:xfrm>
+            <a:off x="5004048" y="2780928"/>
+            <a:ext cx="0" cy="1656184"/>
+          </a:xfrm>
+          <a:prstGeom prst="line">
+            <a:avLst/>
+          </a:prstGeom>
+        </p:spPr>
+        <p:style>
+          <a:lnRef idx="1">
+            <a:schemeClr val="accent1"/>
+          </a:lnRef>
+          <a:fillRef idx="0">
+            <a:schemeClr val="accent1"/>
+          </a:fillRef>
+          <a:effectRef idx="0">
+            <a:schemeClr val="accent1"/>
+          </a:effectRef>
+          <a:fontRef idx="minor">
+            <a:schemeClr val="tx1"/>
+          </a:fontRef>
+        </p:style>
+      </p:cxnSp>
+    </p:spTree>
+  </p:cSld>
+  <p:clrMapOvr>
+    <a:masterClrMapping/>
+  </p:clrMapOvr>
+</p:sld>
+</file>
+
+<file path=ppt/slides/slide12.xml><?xml version="1.0" encoding="utf-8"?>
+<p:sld xmlns:a="http://schemas.openxmlformats.org/drawingml/2006/main" xmlns:r="http://schemas.openxmlformats.org/officeDocument/2006/relationships" xmlns:p="http://schemas.openxmlformats.org/presentationml/2006/main">
+  <p:cSld>
+    <p:spTree>
+      <p:nvGrpSpPr>
+        <p:cNvPr id="1" name=""/>
+        <p:cNvGrpSpPr/>
+        <p:nvPr/>
+      </p:nvGrpSpPr>
+      <p:grpSpPr>
+        <a:xfrm>
+          <a:off x="0" y="0"/>
+          <a:ext cx="0" cy="0"/>
+          <a:chOff x="0" y="0"/>
+          <a:chExt cx="0" cy="0"/>
+        </a:xfrm>
+      </p:grpSpPr>
+      <p:sp>
+        <p:nvSpPr>
+          <p:cNvPr id="2" name="1 CuadroTexto"/>
+          <p:cNvSpPr txBox="1"/>
+          <p:nvPr/>
+        </p:nvSpPr>
+        <p:spPr>
+          <a:xfrm>
+            <a:off x="323528" y="0"/>
+            <a:ext cx="8208912" cy="461665"/>
+          </a:xfrm>
+          <a:prstGeom prst="rect">
+            <a:avLst/>
+          </a:prstGeom>
+          <a:noFill/>
+        </p:spPr>
+        <p:txBody>
+          <a:bodyPr wrap="square" rtlCol="0">
+            <a:spAutoFit/>
+          </a:bodyPr>
+          <a:lstStyle/>
+          <a:p>
+            <a:r>
+              <a:rPr lang="es-ES" sz="2400" b="1" dirty="0" smtClean="0"/>
+              <a:t>Pasos creación proyecto </a:t>
+            </a:r>
+            <a:r>
+              <a:rPr lang="es-ES" sz="2400" b="1" dirty="0" err="1" smtClean="0"/>
+              <a:t>backend</a:t>
+            </a:r>
+            <a:r>
+              <a:rPr lang="es-ES" sz="2400" b="1" dirty="0" smtClean="0"/>
+              <a:t> con </a:t>
+            </a:r>
+            <a:r>
+              <a:rPr lang="es-ES" sz="2400" b="1" dirty="0" err="1" smtClean="0"/>
+              <a:t>NestJS</a:t>
+            </a:r>
+            <a:r>
+              <a:rPr lang="es-ES" sz="2400" b="1" dirty="0" smtClean="0"/>
+              <a:t> (servicios REST)</a:t>
+            </a:r>
+            <a:endParaRPr lang="es-ES" sz="2400" b="1" dirty="0"/>
+          </a:p>
+        </p:txBody>
+      </p:sp>
+      <p:sp>
+        <p:nvSpPr>
+          <p:cNvPr id="3" name="2 CuadroTexto"/>
+          <p:cNvSpPr txBox="1"/>
+          <p:nvPr/>
+        </p:nvSpPr>
+        <p:spPr>
+          <a:xfrm>
+            <a:off x="323528" y="476672"/>
+            <a:ext cx="7776864" cy="6186309"/>
+          </a:xfrm>
+          <a:prstGeom prst="rect">
+            <a:avLst/>
+          </a:prstGeom>
+          <a:noFill/>
+        </p:spPr>
+        <p:txBody>
+          <a:bodyPr wrap="square" rtlCol="0">
+            <a:spAutoFit/>
+          </a:bodyPr>
+          <a:lstStyle/>
+          <a:p>
+            <a:pPr>
+              <a:buFontTx/>
+              <a:buChar char="-"/>
+            </a:pPr>
+            <a:r>
+              <a:rPr lang="es-ES" dirty="0" smtClean="0"/>
+              <a:t>C</a:t>
+            </a:r>
+            <a:r>
+              <a:rPr lang="es-ES" dirty="0" smtClean="0"/>
+              <a:t>reación proyecto:</a:t>
+            </a:r>
+          </a:p>
+          <a:p>
+            <a:pPr lvl="1"/>
+            <a:r>
+              <a:rPr lang="es-ES" dirty="0" smtClean="0"/>
+              <a:t>&gt;</a:t>
+            </a:r>
+            <a:r>
+              <a:rPr lang="es-ES" dirty="0" err="1" smtClean="0"/>
+              <a:t>nest</a:t>
+            </a:r>
+            <a:r>
+              <a:rPr lang="es-ES" dirty="0" smtClean="0"/>
+              <a:t> new </a:t>
+            </a:r>
+            <a:r>
+              <a:rPr lang="es-ES" dirty="0" err="1" smtClean="0"/>
+              <a:t>nombre_proyecto</a:t>
+            </a:r>
+            <a:endParaRPr lang="es-ES" dirty="0" smtClean="0"/>
+          </a:p>
+          <a:p>
+            <a:pPr lvl="1"/>
+            <a:r>
+              <a:rPr lang="es-ES" dirty="0" smtClean="0"/>
+              <a:t>Eliminar .</a:t>
+            </a:r>
+            <a:r>
+              <a:rPr lang="es-ES" dirty="0" err="1" smtClean="0"/>
+              <a:t>git</a:t>
+            </a:r>
+            <a:endParaRPr lang="es-ES" dirty="0" smtClean="0"/>
+          </a:p>
+          <a:p>
+            <a:pPr lvl="1"/>
+            <a:r>
+              <a:rPr lang="es-ES" dirty="0" smtClean="0"/>
+              <a:t>Eliminar entradas </a:t>
+            </a:r>
+            <a:r>
+              <a:rPr lang="es-ES" dirty="0" err="1" smtClean="0"/>
+              <a:t>eslint</a:t>
+            </a:r>
+            <a:endParaRPr lang="es-ES" dirty="0" smtClean="0"/>
+          </a:p>
+          <a:p>
+            <a:pPr lvl="1"/>
+            <a:r>
+              <a:rPr lang="es-ES" dirty="0" smtClean="0"/>
+              <a:t>Desactivar chequeo de nulos</a:t>
+            </a:r>
+          </a:p>
+          <a:p>
+            <a:r>
+              <a:rPr lang="es-ES" dirty="0" smtClean="0"/>
+              <a:t>-Si vamos a utilizar acceso a bases de datos, instalar </a:t>
+            </a:r>
+            <a:r>
+              <a:rPr lang="es-ES" dirty="0" err="1" smtClean="0"/>
+              <a:t>typeORM</a:t>
+            </a:r>
+            <a:endParaRPr lang="es-ES" dirty="0" smtClean="0"/>
+          </a:p>
+          <a:p>
+            <a:r>
+              <a:rPr lang="es-ES" dirty="0" smtClean="0"/>
+              <a:t>-Creación de entidades y sus relaciones</a:t>
+            </a:r>
+          </a:p>
+          <a:p>
+            <a:r>
+              <a:rPr lang="es-ES" dirty="0" smtClean="0"/>
+              <a:t>-Creación de </a:t>
+            </a:r>
+            <a:r>
+              <a:rPr lang="es-ES" dirty="0" err="1" smtClean="0"/>
+              <a:t>DTOs</a:t>
+            </a:r>
+            <a:r>
+              <a:rPr lang="es-ES" dirty="0" smtClean="0"/>
+              <a:t>, tanto para entrada de datos como para salida de datos. Añadir validadores en los </a:t>
+            </a:r>
+            <a:r>
+              <a:rPr lang="es-ES" dirty="0" err="1" smtClean="0"/>
+              <a:t>DTOs</a:t>
+            </a:r>
+            <a:r>
+              <a:rPr lang="es-ES" dirty="0" smtClean="0"/>
+              <a:t> de entrada de datos</a:t>
+            </a:r>
+          </a:p>
+          <a:p>
+            <a:r>
+              <a:rPr lang="es-ES" dirty="0" smtClean="0"/>
+              <a:t>-Implementación del </a:t>
+            </a:r>
+            <a:r>
+              <a:rPr lang="es-ES" dirty="0" err="1" smtClean="0"/>
+              <a:t>service</a:t>
+            </a:r>
+            <a:r>
+              <a:rPr lang="es-ES" dirty="0" smtClean="0"/>
+              <a:t>. Dentro de los métodos del </a:t>
+            </a:r>
+            <a:r>
+              <a:rPr lang="es-ES" dirty="0" err="1" smtClean="0"/>
+              <a:t>service</a:t>
+            </a:r>
+            <a:r>
+              <a:rPr lang="es-ES" dirty="0" smtClean="0"/>
+              <a:t>, se realizan comprobaciones de integridad de los datos (evitar campos repetidos, etc.). Informando en los tipos de devolución o mediante la generación de errores de aquellas situaciones anómalas que se puedan producir.</a:t>
+            </a:r>
+          </a:p>
+          <a:p>
+            <a:r>
+              <a:rPr lang="es-ES" dirty="0" smtClean="0"/>
+              <a:t>-Implementación del </a:t>
+            </a:r>
+            <a:r>
+              <a:rPr lang="es-ES" dirty="0" err="1" smtClean="0"/>
+              <a:t>controller</a:t>
+            </a:r>
+            <a:r>
+              <a:rPr lang="es-ES" dirty="0" smtClean="0"/>
+              <a:t>. Aquí pensamos en los métodos que hay que exponer al exterior, hacia el </a:t>
+            </a:r>
+            <a:r>
+              <a:rPr lang="es-ES" dirty="0" err="1" smtClean="0"/>
+              <a:t>front</a:t>
+            </a:r>
+            <a:r>
+              <a:rPr lang="es-ES" dirty="0" smtClean="0"/>
+              <a:t>. Se informa mediante códigos de estado sobre situaciones anómalas que se puedan producir.</a:t>
+            </a:r>
+          </a:p>
+          <a:p>
+            <a:r>
+              <a:rPr lang="es-ES" dirty="0" smtClean="0"/>
+              <a:t>-Utilización de variables de entorno para datos sensibles</a:t>
+            </a:r>
+          </a:p>
+          <a:p>
+            <a:r>
+              <a:rPr lang="es-ES" dirty="0" smtClean="0"/>
+              <a:t>-Incorporar </a:t>
+            </a:r>
+            <a:r>
+              <a:rPr lang="es-ES" dirty="0" err="1" smtClean="0"/>
+              <a:t>swagger</a:t>
+            </a:r>
+            <a:r>
+              <a:rPr lang="es-ES" dirty="0" smtClean="0"/>
+              <a:t> para documentar el servicio</a:t>
+            </a:r>
+            <a:endParaRPr lang="es-ES" dirty="0" smtClean="0"/>
+          </a:p>
+          <a:p>
+            <a:r>
+              <a:rPr lang="es-ES" dirty="0" smtClean="0"/>
+              <a:t>-</a:t>
+            </a:r>
+            <a:r>
+              <a:rPr lang="es-ES" dirty="0" err="1" smtClean="0"/>
+              <a:t>AppModule</a:t>
+            </a:r>
+            <a:r>
+              <a:rPr lang="es-ES" dirty="0" smtClean="0"/>
+              <a:t>:</a:t>
+            </a:r>
+          </a:p>
+          <a:p>
+            <a:r>
+              <a:rPr lang="es-ES" dirty="0" smtClean="0"/>
+              <a:t>	</a:t>
+            </a:r>
+            <a:r>
+              <a:rPr lang="es-ES" dirty="0" smtClean="0"/>
+              <a:t>.Registro de </a:t>
+            </a:r>
+            <a:r>
+              <a:rPr lang="es-ES" dirty="0" err="1" smtClean="0"/>
+              <a:t>service</a:t>
+            </a:r>
+            <a:r>
+              <a:rPr lang="es-ES" dirty="0" smtClean="0"/>
+              <a:t> y </a:t>
+            </a:r>
+            <a:r>
+              <a:rPr lang="es-ES" dirty="0" err="1" smtClean="0"/>
+              <a:t>controller</a:t>
+            </a:r>
+            <a:endParaRPr lang="es-ES" dirty="0" smtClean="0"/>
+          </a:p>
+          <a:p>
+            <a:r>
+              <a:rPr lang="es-ES" dirty="0" smtClean="0"/>
+              <a:t>	.Información de conexión a base de datos y entidades</a:t>
+            </a:r>
+          </a:p>
+          <a:p>
+            <a:r>
+              <a:rPr lang="es-ES" dirty="0" smtClean="0"/>
+              <a:t>	</a:t>
+            </a:r>
+            <a:r>
+              <a:rPr lang="es-ES" dirty="0" smtClean="0"/>
+              <a:t>.Acceso a variables de entorno para datos de conexión a base de datos</a:t>
+            </a:r>
+          </a:p>
+        </p:txBody>
+      </p:sp>
+    </p:spTree>
+  </p:cSld>
+  <p:clrMapOvr>
+    <a:masterClrMapping/>
+  </p:clrMapOvr>
+</p:sld>
+</file>
+
 <file path=ppt/slides/slide2.xml><?xml version="1.0" encoding="utf-8"?>
 <p:sld xmlns:a="http://schemas.openxmlformats.org/drawingml/2006/main" xmlns:r="http://schemas.openxmlformats.org/officeDocument/2006/relationships" xmlns:p="http://schemas.openxmlformats.org/presentationml/2006/main">
   <p:cSld>
@@ -6257,6 +7137,999 @@
           </a:ln>
         </p:spPr>
       </p:pic>
+    </p:spTree>
+  </p:cSld>
+  <p:clrMapOvr>
+    <a:masterClrMapping/>
+  </p:clrMapOvr>
+</p:sld>
+</file>
+
+<file path=ppt/slides/slide8.xml><?xml version="1.0" encoding="utf-8"?>
+<p:sld xmlns:a="http://schemas.openxmlformats.org/drawingml/2006/main" xmlns:r="http://schemas.openxmlformats.org/officeDocument/2006/relationships" xmlns:p="http://schemas.openxmlformats.org/presentationml/2006/main">
+  <p:cSld>
+    <p:spTree>
+      <p:nvGrpSpPr>
+        <p:cNvPr id="1" name=""/>
+        <p:cNvGrpSpPr/>
+        <p:nvPr/>
+      </p:nvGrpSpPr>
+      <p:grpSpPr>
+        <a:xfrm>
+          <a:off x="0" y="0"/>
+          <a:ext cx="0" cy="0"/>
+          <a:chOff x="0" y="0"/>
+          <a:chExt cx="0" cy="0"/>
+        </a:xfrm>
+      </p:grpSpPr>
+      <p:sp>
+        <p:nvSpPr>
+          <p:cNvPr id="2" name="1 Elipse"/>
+          <p:cNvSpPr/>
+          <p:nvPr/>
+        </p:nvSpPr>
+        <p:spPr>
+          <a:xfrm>
+            <a:off x="971600" y="1412776"/>
+            <a:ext cx="1728192" cy="1584176"/>
+          </a:xfrm>
+          <a:prstGeom prst="ellipse">
+            <a:avLst/>
+          </a:prstGeom>
+        </p:spPr>
+        <p:style>
+          <a:lnRef idx="2">
+            <a:schemeClr val="accent1">
+              <a:shade val="50000"/>
+            </a:schemeClr>
+          </a:lnRef>
+          <a:fillRef idx="1">
+            <a:schemeClr val="accent1"/>
+          </a:fillRef>
+          <a:effectRef idx="0">
+            <a:schemeClr val="accent1"/>
+          </a:effectRef>
+          <a:fontRef idx="minor">
+            <a:schemeClr val="lt1"/>
+          </a:fontRef>
+        </p:style>
+        <p:txBody>
+          <a:bodyPr rtlCol="0" anchor="ctr"/>
+          <a:lstStyle/>
+          <a:p>
+            <a:pPr algn="ctr"/>
+            <a:endParaRPr lang="es-ES"/>
+          </a:p>
+        </p:txBody>
+      </p:sp>
+      <p:sp>
+        <p:nvSpPr>
+          <p:cNvPr id="3" name="2 CuadroTexto"/>
+          <p:cNvSpPr txBox="1"/>
+          <p:nvPr/>
+        </p:nvSpPr>
+        <p:spPr>
+          <a:xfrm>
+            <a:off x="1259632" y="980728"/>
+            <a:ext cx="1872208" cy="369332"/>
+          </a:xfrm>
+          <a:prstGeom prst="rect">
+            <a:avLst/>
+          </a:prstGeom>
+          <a:noFill/>
+        </p:spPr>
+        <p:txBody>
+          <a:bodyPr wrap="square" rtlCol="0">
+            <a:spAutoFit/>
+          </a:bodyPr>
+          <a:lstStyle/>
+          <a:p>
+            <a:r>
+              <a:rPr lang="es-ES" dirty="0" smtClean="0"/>
+              <a:t>Alumno</a:t>
+            </a:r>
+            <a:endParaRPr lang="es-ES" dirty="0"/>
+          </a:p>
+        </p:txBody>
+      </p:sp>
+      <p:sp>
+        <p:nvSpPr>
+          <p:cNvPr id="4" name="3 Elipse"/>
+          <p:cNvSpPr/>
+          <p:nvPr/>
+        </p:nvSpPr>
+        <p:spPr>
+          <a:xfrm>
+            <a:off x="5580112" y="1412776"/>
+            <a:ext cx="1728192" cy="1584176"/>
+          </a:xfrm>
+          <a:prstGeom prst="ellipse">
+            <a:avLst/>
+          </a:prstGeom>
+        </p:spPr>
+        <p:style>
+          <a:lnRef idx="2">
+            <a:schemeClr val="accent1">
+              <a:shade val="50000"/>
+            </a:schemeClr>
+          </a:lnRef>
+          <a:fillRef idx="1">
+            <a:schemeClr val="accent1"/>
+          </a:fillRef>
+          <a:effectRef idx="0">
+            <a:schemeClr val="accent1"/>
+          </a:effectRef>
+          <a:fontRef idx="minor">
+            <a:schemeClr val="lt1"/>
+          </a:fontRef>
+        </p:style>
+        <p:txBody>
+          <a:bodyPr rtlCol="0" anchor="ctr"/>
+          <a:lstStyle/>
+          <a:p>
+            <a:pPr algn="ctr"/>
+            <a:endParaRPr lang="es-ES"/>
+          </a:p>
+        </p:txBody>
+      </p:sp>
+      <p:sp>
+        <p:nvSpPr>
+          <p:cNvPr id="5" name="4 CuadroTexto"/>
+          <p:cNvSpPr txBox="1"/>
+          <p:nvPr/>
+        </p:nvSpPr>
+        <p:spPr>
+          <a:xfrm>
+            <a:off x="5868144" y="980728"/>
+            <a:ext cx="1872208" cy="369332"/>
+          </a:xfrm>
+          <a:prstGeom prst="rect">
+            <a:avLst/>
+          </a:prstGeom>
+          <a:noFill/>
+        </p:spPr>
+        <p:txBody>
+          <a:bodyPr wrap="square" rtlCol="0">
+            <a:spAutoFit/>
+          </a:bodyPr>
+          <a:lstStyle/>
+          <a:p>
+            <a:r>
+              <a:rPr lang="es-ES" dirty="0" smtClean="0"/>
+              <a:t>Curso</a:t>
+            </a:r>
+            <a:endParaRPr lang="es-ES" dirty="0"/>
+          </a:p>
+        </p:txBody>
+      </p:sp>
+      <p:cxnSp>
+        <p:nvCxnSpPr>
+          <p:cNvPr id="7" name="6 Conector recto de flecha"/>
+          <p:cNvCxnSpPr/>
+          <p:nvPr/>
+        </p:nvCxnSpPr>
+        <p:spPr>
+          <a:xfrm>
+            <a:off x="2699792" y="1916832"/>
+            <a:ext cx="2880320" cy="0"/>
+          </a:xfrm>
+          <a:prstGeom prst="straightConnector1">
+            <a:avLst/>
+          </a:prstGeom>
+          <a:ln>
+            <a:tailEnd type="arrow"/>
+          </a:ln>
+        </p:spPr>
+        <p:style>
+          <a:lnRef idx="1">
+            <a:schemeClr val="accent1"/>
+          </a:lnRef>
+          <a:fillRef idx="0">
+            <a:schemeClr val="accent1"/>
+          </a:fillRef>
+          <a:effectRef idx="0">
+            <a:schemeClr val="accent1"/>
+          </a:effectRef>
+          <a:fontRef idx="minor">
+            <a:schemeClr val="tx1"/>
+          </a:fontRef>
+        </p:style>
+      </p:cxnSp>
+      <p:cxnSp>
+        <p:nvCxnSpPr>
+          <p:cNvPr id="9" name="8 Conector recto de flecha"/>
+          <p:cNvCxnSpPr/>
+          <p:nvPr/>
+        </p:nvCxnSpPr>
+        <p:spPr>
+          <a:xfrm flipH="1" flipV="1">
+            <a:off x="2627784" y="2564904"/>
+            <a:ext cx="3024336" cy="72008"/>
+          </a:xfrm>
+          <a:prstGeom prst="straightConnector1">
+            <a:avLst/>
+          </a:prstGeom>
+          <a:ln>
+            <a:tailEnd type="arrow"/>
+          </a:ln>
+        </p:spPr>
+        <p:style>
+          <a:lnRef idx="1">
+            <a:schemeClr val="accent1"/>
+          </a:lnRef>
+          <a:fillRef idx="0">
+            <a:schemeClr val="accent1"/>
+          </a:fillRef>
+          <a:effectRef idx="0">
+            <a:schemeClr val="accent1"/>
+          </a:effectRef>
+          <a:fontRef idx="minor">
+            <a:schemeClr val="tx1"/>
+          </a:fontRef>
+        </p:style>
+      </p:cxnSp>
+      <p:sp>
+        <p:nvSpPr>
+          <p:cNvPr id="10" name="9 CuadroTexto"/>
+          <p:cNvSpPr txBox="1"/>
+          <p:nvPr/>
+        </p:nvSpPr>
+        <p:spPr>
+          <a:xfrm>
+            <a:off x="2771800" y="1556792"/>
+            <a:ext cx="1080120" cy="400110"/>
+          </a:xfrm>
+          <a:prstGeom prst="rect">
+            <a:avLst/>
+          </a:prstGeom>
+          <a:noFill/>
+        </p:spPr>
+        <p:txBody>
+          <a:bodyPr wrap="square" rtlCol="0">
+            <a:spAutoFit/>
+          </a:bodyPr>
+          <a:lstStyle/>
+          <a:p>
+            <a:r>
+              <a:rPr lang="es-ES" sz="2000" dirty="0" smtClean="0"/>
+              <a:t>n</a:t>
+            </a:r>
+            <a:endParaRPr lang="es-ES" sz="2000" dirty="0"/>
+          </a:p>
+        </p:txBody>
+      </p:sp>
+      <p:sp>
+        <p:nvSpPr>
+          <p:cNvPr id="11" name="10 CuadroTexto"/>
+          <p:cNvSpPr txBox="1"/>
+          <p:nvPr/>
+        </p:nvSpPr>
+        <p:spPr>
+          <a:xfrm>
+            <a:off x="5076056" y="1556792"/>
+            <a:ext cx="1080120" cy="400110"/>
+          </a:xfrm>
+          <a:prstGeom prst="rect">
+            <a:avLst/>
+          </a:prstGeom>
+          <a:noFill/>
+        </p:spPr>
+        <p:txBody>
+          <a:bodyPr wrap="square" rtlCol="0">
+            <a:spAutoFit/>
+          </a:bodyPr>
+          <a:lstStyle/>
+          <a:p>
+            <a:r>
+              <a:rPr lang="es-ES" sz="2000" dirty="0" smtClean="0"/>
+              <a:t>n</a:t>
+            </a:r>
+            <a:endParaRPr lang="es-ES" sz="2000" dirty="0"/>
+          </a:p>
+        </p:txBody>
+      </p:sp>
+      <p:sp>
+        <p:nvSpPr>
+          <p:cNvPr id="12" name="11 CuadroTexto"/>
+          <p:cNvSpPr txBox="1"/>
+          <p:nvPr/>
+        </p:nvSpPr>
+        <p:spPr>
+          <a:xfrm>
+            <a:off x="5076056" y="2276872"/>
+            <a:ext cx="1080120" cy="400110"/>
+          </a:xfrm>
+          <a:prstGeom prst="rect">
+            <a:avLst/>
+          </a:prstGeom>
+          <a:noFill/>
+        </p:spPr>
+        <p:txBody>
+          <a:bodyPr wrap="square" rtlCol="0">
+            <a:spAutoFit/>
+          </a:bodyPr>
+          <a:lstStyle/>
+          <a:p>
+            <a:r>
+              <a:rPr lang="es-ES" sz="2000" dirty="0" smtClean="0"/>
+              <a:t>n</a:t>
+            </a:r>
+            <a:endParaRPr lang="es-ES" sz="2000" dirty="0"/>
+          </a:p>
+        </p:txBody>
+      </p:sp>
+      <p:sp>
+        <p:nvSpPr>
+          <p:cNvPr id="13" name="12 CuadroTexto"/>
+          <p:cNvSpPr txBox="1"/>
+          <p:nvPr/>
+        </p:nvSpPr>
+        <p:spPr>
+          <a:xfrm>
+            <a:off x="2771800" y="2204864"/>
+            <a:ext cx="1080120" cy="400110"/>
+          </a:xfrm>
+          <a:prstGeom prst="rect">
+            <a:avLst/>
+          </a:prstGeom>
+          <a:noFill/>
+        </p:spPr>
+        <p:txBody>
+          <a:bodyPr wrap="square" rtlCol="0">
+            <a:spAutoFit/>
+          </a:bodyPr>
+          <a:lstStyle/>
+          <a:p>
+            <a:r>
+              <a:rPr lang="es-ES" sz="2000" dirty="0" smtClean="0"/>
+              <a:t>n</a:t>
+            </a:r>
+            <a:endParaRPr lang="es-ES" sz="2000" dirty="0"/>
+          </a:p>
+        </p:txBody>
+      </p:sp>
+      <p:sp>
+        <p:nvSpPr>
+          <p:cNvPr id="14" name="13 Rectángulo"/>
+          <p:cNvSpPr/>
+          <p:nvPr/>
+        </p:nvSpPr>
+        <p:spPr>
+          <a:xfrm>
+            <a:off x="2699792" y="4365104"/>
+            <a:ext cx="2664296" cy="1368152"/>
+          </a:xfrm>
+          <a:prstGeom prst="rect">
+            <a:avLst/>
+          </a:prstGeom>
+          <a:noFill/>
+        </p:spPr>
+        <p:style>
+          <a:lnRef idx="2">
+            <a:schemeClr val="accent1">
+              <a:shade val="50000"/>
+            </a:schemeClr>
+          </a:lnRef>
+          <a:fillRef idx="1">
+            <a:schemeClr val="accent1"/>
+          </a:fillRef>
+          <a:effectRef idx="0">
+            <a:schemeClr val="accent1"/>
+          </a:effectRef>
+          <a:fontRef idx="minor">
+            <a:schemeClr val="lt1"/>
+          </a:fontRef>
+        </p:style>
+        <p:txBody>
+          <a:bodyPr rtlCol="0" anchor="ctr"/>
+          <a:lstStyle/>
+          <a:p>
+            <a:pPr algn="ctr"/>
+            <a:endParaRPr lang="es-ES"/>
+          </a:p>
+        </p:txBody>
+      </p:sp>
+      <p:sp>
+        <p:nvSpPr>
+          <p:cNvPr id="15" name="14 CuadroTexto"/>
+          <p:cNvSpPr txBox="1"/>
+          <p:nvPr/>
+        </p:nvSpPr>
+        <p:spPr>
+          <a:xfrm>
+            <a:off x="2987824" y="3933056"/>
+            <a:ext cx="2088232" cy="369332"/>
+          </a:xfrm>
+          <a:prstGeom prst="rect">
+            <a:avLst/>
+          </a:prstGeom>
+          <a:noFill/>
+        </p:spPr>
+        <p:txBody>
+          <a:bodyPr wrap="square" rtlCol="0">
+            <a:spAutoFit/>
+          </a:bodyPr>
+          <a:lstStyle/>
+          <a:p>
+            <a:r>
+              <a:rPr lang="es-ES" dirty="0" smtClean="0"/>
+              <a:t>matriculas</a:t>
+            </a:r>
+            <a:endParaRPr lang="es-ES" dirty="0"/>
+          </a:p>
+        </p:txBody>
+      </p:sp>
+    </p:spTree>
+  </p:cSld>
+  <p:clrMapOvr>
+    <a:masterClrMapping/>
+  </p:clrMapOvr>
+</p:sld>
+</file>
+
+<file path=ppt/slides/slide9.xml><?xml version="1.0" encoding="utf-8"?>
+<p:sld xmlns:a="http://schemas.openxmlformats.org/drawingml/2006/main" xmlns:r="http://schemas.openxmlformats.org/officeDocument/2006/relationships" xmlns:p="http://schemas.openxmlformats.org/presentationml/2006/main">
+  <p:cSld>
+    <p:spTree>
+      <p:nvGrpSpPr>
+        <p:cNvPr id="1" name=""/>
+        <p:cNvGrpSpPr/>
+        <p:nvPr/>
+      </p:nvGrpSpPr>
+      <p:grpSpPr>
+        <a:xfrm>
+          <a:off x="0" y="0"/>
+          <a:ext cx="0" cy="0"/>
+          <a:chOff x="0" y="0"/>
+          <a:chExt cx="0" cy="0"/>
+        </a:xfrm>
+      </p:grpSpPr>
+      <p:sp>
+        <p:nvSpPr>
+          <p:cNvPr id="2" name="1 CuadroTexto"/>
+          <p:cNvSpPr txBox="1"/>
+          <p:nvPr/>
+        </p:nvSpPr>
+        <p:spPr>
+          <a:xfrm>
+            <a:off x="2699792" y="548680"/>
+            <a:ext cx="1296144" cy="523220"/>
+          </a:xfrm>
+          <a:prstGeom prst="rect">
+            <a:avLst/>
+          </a:prstGeom>
+          <a:noFill/>
+        </p:spPr>
+        <p:txBody>
+          <a:bodyPr wrap="square" rtlCol="0">
+            <a:spAutoFit/>
+          </a:bodyPr>
+          <a:lstStyle/>
+          <a:p>
+            <a:r>
+              <a:rPr lang="es-ES" sz="2800" dirty="0" err="1" smtClean="0"/>
+              <a:t>DTOs</a:t>
+            </a:r>
+            <a:endParaRPr lang="es-ES" sz="2800" dirty="0"/>
+          </a:p>
+        </p:txBody>
+      </p:sp>
+      <p:sp>
+        <p:nvSpPr>
+          <p:cNvPr id="3" name="2 Rectángulo"/>
+          <p:cNvSpPr/>
+          <p:nvPr/>
+        </p:nvSpPr>
+        <p:spPr>
+          <a:xfrm>
+            <a:off x="467544" y="1916832"/>
+            <a:ext cx="6696744" cy="2232248"/>
+          </a:xfrm>
+          <a:prstGeom prst="rect">
+            <a:avLst/>
+          </a:prstGeom>
+          <a:noFill/>
+        </p:spPr>
+        <p:style>
+          <a:lnRef idx="2">
+            <a:schemeClr val="accent1">
+              <a:shade val="50000"/>
+            </a:schemeClr>
+          </a:lnRef>
+          <a:fillRef idx="1">
+            <a:schemeClr val="accent1"/>
+          </a:fillRef>
+          <a:effectRef idx="0">
+            <a:schemeClr val="accent1"/>
+          </a:effectRef>
+          <a:fontRef idx="minor">
+            <a:schemeClr val="lt1"/>
+          </a:fontRef>
+        </p:style>
+        <p:txBody>
+          <a:bodyPr rtlCol="0" anchor="ctr"/>
+          <a:lstStyle/>
+          <a:p>
+            <a:pPr algn="ctr"/>
+            <a:endParaRPr lang="es-ES"/>
+          </a:p>
+        </p:txBody>
+      </p:sp>
+      <p:sp>
+        <p:nvSpPr>
+          <p:cNvPr id="4" name="3 CuadroTexto"/>
+          <p:cNvSpPr txBox="1"/>
+          <p:nvPr/>
+        </p:nvSpPr>
+        <p:spPr>
+          <a:xfrm>
+            <a:off x="2771800" y="1412776"/>
+            <a:ext cx="2736304" cy="369332"/>
+          </a:xfrm>
+          <a:prstGeom prst="rect">
+            <a:avLst/>
+          </a:prstGeom>
+          <a:noFill/>
+        </p:spPr>
+        <p:txBody>
+          <a:bodyPr wrap="square" rtlCol="0">
+            <a:spAutoFit/>
+          </a:bodyPr>
+          <a:lstStyle/>
+          <a:p>
+            <a:r>
+              <a:rPr lang="es-ES" dirty="0" smtClean="0"/>
+              <a:t>Servicio REST </a:t>
+            </a:r>
+            <a:endParaRPr lang="es-ES" dirty="0"/>
+          </a:p>
+        </p:txBody>
+      </p:sp>
+      <p:sp>
+        <p:nvSpPr>
+          <p:cNvPr id="5" name="4 Disco magnético"/>
+          <p:cNvSpPr/>
+          <p:nvPr/>
+        </p:nvSpPr>
+        <p:spPr>
+          <a:xfrm>
+            <a:off x="7812360" y="2780928"/>
+            <a:ext cx="936104" cy="792088"/>
+          </a:xfrm>
+          <a:prstGeom prst="flowChartMagneticDisk">
+            <a:avLst/>
+          </a:prstGeom>
+        </p:spPr>
+        <p:style>
+          <a:lnRef idx="2">
+            <a:schemeClr val="accent1">
+              <a:shade val="50000"/>
+            </a:schemeClr>
+          </a:lnRef>
+          <a:fillRef idx="1">
+            <a:schemeClr val="accent1"/>
+          </a:fillRef>
+          <a:effectRef idx="0">
+            <a:schemeClr val="accent1"/>
+          </a:effectRef>
+          <a:fontRef idx="minor">
+            <a:schemeClr val="lt1"/>
+          </a:fontRef>
+        </p:style>
+        <p:txBody>
+          <a:bodyPr rtlCol="0" anchor="ctr"/>
+          <a:lstStyle/>
+          <a:p>
+            <a:pPr algn="ctr"/>
+            <a:endParaRPr lang="es-ES"/>
+          </a:p>
+        </p:txBody>
+      </p:sp>
+      <p:sp>
+        <p:nvSpPr>
+          <p:cNvPr id="6" name="5 Rectángulo redondeado"/>
+          <p:cNvSpPr/>
+          <p:nvPr/>
+        </p:nvSpPr>
+        <p:spPr>
+          <a:xfrm>
+            <a:off x="5220072" y="2636912"/>
+            <a:ext cx="1656184" cy="792088"/>
+          </a:xfrm>
+          <a:prstGeom prst="roundRect">
+            <a:avLst/>
+          </a:prstGeom>
+        </p:spPr>
+        <p:style>
+          <a:lnRef idx="2">
+            <a:schemeClr val="accent1">
+              <a:shade val="50000"/>
+            </a:schemeClr>
+          </a:lnRef>
+          <a:fillRef idx="1">
+            <a:schemeClr val="accent1"/>
+          </a:fillRef>
+          <a:effectRef idx="0">
+            <a:schemeClr val="accent1"/>
+          </a:effectRef>
+          <a:fontRef idx="minor">
+            <a:schemeClr val="lt1"/>
+          </a:fontRef>
+        </p:style>
+        <p:txBody>
+          <a:bodyPr rtlCol="0" anchor="ctr"/>
+          <a:lstStyle/>
+          <a:p>
+            <a:pPr algn="ctr"/>
+            <a:endParaRPr lang="es-ES"/>
+          </a:p>
+        </p:txBody>
+      </p:sp>
+      <p:sp>
+        <p:nvSpPr>
+          <p:cNvPr id="7" name="6 CuadroTexto"/>
+          <p:cNvSpPr txBox="1"/>
+          <p:nvPr/>
+        </p:nvSpPr>
+        <p:spPr>
+          <a:xfrm>
+            <a:off x="5580112" y="2852936"/>
+            <a:ext cx="1152128" cy="369332"/>
+          </a:xfrm>
+          <a:prstGeom prst="rect">
+            <a:avLst/>
+          </a:prstGeom>
+          <a:noFill/>
+        </p:spPr>
+        <p:txBody>
+          <a:bodyPr wrap="square" rtlCol="0">
+            <a:spAutoFit/>
+          </a:bodyPr>
+          <a:lstStyle/>
+          <a:p>
+            <a:r>
+              <a:rPr lang="es-ES" dirty="0" err="1" smtClean="0"/>
+              <a:t>repository</a:t>
+            </a:r>
+            <a:endParaRPr lang="es-ES" dirty="0"/>
+          </a:p>
+        </p:txBody>
+      </p:sp>
+      <p:sp>
+        <p:nvSpPr>
+          <p:cNvPr id="8" name="7 Rectángulo redondeado"/>
+          <p:cNvSpPr/>
+          <p:nvPr/>
+        </p:nvSpPr>
+        <p:spPr>
+          <a:xfrm>
+            <a:off x="3059832" y="2636912"/>
+            <a:ext cx="1656184" cy="792088"/>
+          </a:xfrm>
+          <a:prstGeom prst="roundRect">
+            <a:avLst/>
+          </a:prstGeom>
+        </p:spPr>
+        <p:style>
+          <a:lnRef idx="2">
+            <a:schemeClr val="accent1">
+              <a:shade val="50000"/>
+            </a:schemeClr>
+          </a:lnRef>
+          <a:fillRef idx="1">
+            <a:schemeClr val="accent1"/>
+          </a:fillRef>
+          <a:effectRef idx="0">
+            <a:schemeClr val="accent1"/>
+          </a:effectRef>
+          <a:fontRef idx="minor">
+            <a:schemeClr val="lt1"/>
+          </a:fontRef>
+        </p:style>
+        <p:txBody>
+          <a:bodyPr rtlCol="0" anchor="ctr"/>
+          <a:lstStyle/>
+          <a:p>
+            <a:pPr algn="ctr"/>
+            <a:endParaRPr lang="es-ES"/>
+          </a:p>
+        </p:txBody>
+      </p:sp>
+      <p:sp>
+        <p:nvSpPr>
+          <p:cNvPr id="9" name="8 CuadroTexto"/>
+          <p:cNvSpPr txBox="1"/>
+          <p:nvPr/>
+        </p:nvSpPr>
+        <p:spPr>
+          <a:xfrm>
+            <a:off x="3419872" y="2852936"/>
+            <a:ext cx="1152128" cy="369332"/>
+          </a:xfrm>
+          <a:prstGeom prst="rect">
+            <a:avLst/>
+          </a:prstGeom>
+          <a:noFill/>
+        </p:spPr>
+        <p:txBody>
+          <a:bodyPr wrap="square" rtlCol="0">
+            <a:spAutoFit/>
+          </a:bodyPr>
+          <a:lstStyle/>
+          <a:p>
+            <a:r>
+              <a:rPr lang="es-ES" dirty="0" err="1" smtClean="0"/>
+              <a:t>service</a:t>
+            </a:r>
+            <a:endParaRPr lang="es-ES" dirty="0"/>
+          </a:p>
+        </p:txBody>
+      </p:sp>
+      <p:sp>
+        <p:nvSpPr>
+          <p:cNvPr id="10" name="9 Rectángulo redondeado"/>
+          <p:cNvSpPr/>
+          <p:nvPr/>
+        </p:nvSpPr>
+        <p:spPr>
+          <a:xfrm>
+            <a:off x="755576" y="2636912"/>
+            <a:ext cx="1656184" cy="792088"/>
+          </a:xfrm>
+          <a:prstGeom prst="roundRect">
+            <a:avLst/>
+          </a:prstGeom>
+        </p:spPr>
+        <p:style>
+          <a:lnRef idx="2">
+            <a:schemeClr val="accent1">
+              <a:shade val="50000"/>
+            </a:schemeClr>
+          </a:lnRef>
+          <a:fillRef idx="1">
+            <a:schemeClr val="accent1"/>
+          </a:fillRef>
+          <a:effectRef idx="0">
+            <a:schemeClr val="accent1"/>
+          </a:effectRef>
+          <a:fontRef idx="minor">
+            <a:schemeClr val="lt1"/>
+          </a:fontRef>
+        </p:style>
+        <p:txBody>
+          <a:bodyPr rtlCol="0" anchor="ctr"/>
+          <a:lstStyle/>
+          <a:p>
+            <a:pPr algn="ctr"/>
+            <a:endParaRPr lang="es-ES"/>
+          </a:p>
+        </p:txBody>
+      </p:sp>
+      <p:sp>
+        <p:nvSpPr>
+          <p:cNvPr id="11" name="10 CuadroTexto"/>
+          <p:cNvSpPr txBox="1"/>
+          <p:nvPr/>
+        </p:nvSpPr>
+        <p:spPr>
+          <a:xfrm>
+            <a:off x="1115616" y="2852936"/>
+            <a:ext cx="1152128" cy="369332"/>
+          </a:xfrm>
+          <a:prstGeom prst="rect">
+            <a:avLst/>
+          </a:prstGeom>
+          <a:noFill/>
+        </p:spPr>
+        <p:txBody>
+          <a:bodyPr wrap="square" rtlCol="0">
+            <a:spAutoFit/>
+          </a:bodyPr>
+          <a:lstStyle/>
+          <a:p>
+            <a:r>
+              <a:rPr lang="es-ES" dirty="0" err="1" smtClean="0"/>
+              <a:t>controller</a:t>
+            </a:r>
+            <a:endParaRPr lang="es-ES" dirty="0"/>
+          </a:p>
+        </p:txBody>
+      </p:sp>
+      <p:cxnSp>
+        <p:nvCxnSpPr>
+          <p:cNvPr id="13" name="12 Conector recto de flecha"/>
+          <p:cNvCxnSpPr>
+            <a:stCxn id="8" idx="3"/>
+            <a:endCxn id="6" idx="1"/>
+          </p:cNvCxnSpPr>
+          <p:nvPr/>
+        </p:nvCxnSpPr>
+        <p:spPr>
+          <a:xfrm>
+            <a:off x="4716016" y="3032956"/>
+            <a:ext cx="504056" cy="0"/>
+          </a:xfrm>
+          <a:prstGeom prst="straightConnector1">
+            <a:avLst/>
+          </a:prstGeom>
+          <a:ln>
+            <a:headEnd type="triangle"/>
+            <a:tailEnd type="triangle"/>
+          </a:ln>
+        </p:spPr>
+        <p:style>
+          <a:lnRef idx="1">
+            <a:schemeClr val="accent1"/>
+          </a:lnRef>
+          <a:fillRef idx="0">
+            <a:schemeClr val="accent1"/>
+          </a:fillRef>
+          <a:effectRef idx="0">
+            <a:schemeClr val="accent1"/>
+          </a:effectRef>
+          <a:fontRef idx="minor">
+            <a:schemeClr val="tx1"/>
+          </a:fontRef>
+        </p:style>
+      </p:cxnSp>
+      <p:sp>
+        <p:nvSpPr>
+          <p:cNvPr id="14" name="13 CuadroTexto"/>
+          <p:cNvSpPr txBox="1"/>
+          <p:nvPr/>
+        </p:nvSpPr>
+        <p:spPr>
+          <a:xfrm>
+            <a:off x="4572000" y="2204864"/>
+            <a:ext cx="1296144" cy="369332"/>
+          </a:xfrm>
+          <a:prstGeom prst="rect">
+            <a:avLst/>
+          </a:prstGeom>
+          <a:noFill/>
+        </p:spPr>
+        <p:txBody>
+          <a:bodyPr wrap="square" rtlCol="0">
+            <a:spAutoFit/>
+          </a:bodyPr>
+          <a:lstStyle/>
+          <a:p>
+            <a:r>
+              <a:rPr lang="es-ES" dirty="0" smtClean="0"/>
+              <a:t>entidades</a:t>
+            </a:r>
+            <a:endParaRPr lang="es-ES" dirty="0"/>
+          </a:p>
+        </p:txBody>
+      </p:sp>
+      <p:cxnSp>
+        <p:nvCxnSpPr>
+          <p:cNvPr id="15" name="14 Conector recto de flecha"/>
+          <p:cNvCxnSpPr/>
+          <p:nvPr/>
+        </p:nvCxnSpPr>
+        <p:spPr>
+          <a:xfrm>
+            <a:off x="2483768" y="3068960"/>
+            <a:ext cx="504056" cy="0"/>
+          </a:xfrm>
+          <a:prstGeom prst="straightConnector1">
+            <a:avLst/>
+          </a:prstGeom>
+          <a:ln>
+            <a:headEnd type="triangle"/>
+            <a:tailEnd type="triangle"/>
+          </a:ln>
+        </p:spPr>
+        <p:style>
+          <a:lnRef idx="1">
+            <a:schemeClr val="accent1"/>
+          </a:lnRef>
+          <a:fillRef idx="0">
+            <a:schemeClr val="accent1"/>
+          </a:fillRef>
+          <a:effectRef idx="0">
+            <a:schemeClr val="accent1"/>
+          </a:effectRef>
+          <a:fontRef idx="minor">
+            <a:schemeClr val="tx1"/>
+          </a:fontRef>
+        </p:style>
+      </p:cxnSp>
+      <p:cxnSp>
+        <p:nvCxnSpPr>
+          <p:cNvPr id="16" name="15 Conector recto de flecha"/>
+          <p:cNvCxnSpPr/>
+          <p:nvPr/>
+        </p:nvCxnSpPr>
+        <p:spPr>
+          <a:xfrm>
+            <a:off x="179512" y="3068960"/>
+            <a:ext cx="504056" cy="0"/>
+          </a:xfrm>
+          <a:prstGeom prst="straightConnector1">
+            <a:avLst/>
+          </a:prstGeom>
+          <a:ln>
+            <a:headEnd type="triangle"/>
+            <a:tailEnd type="triangle"/>
+          </a:ln>
+        </p:spPr>
+        <p:style>
+          <a:lnRef idx="1">
+            <a:schemeClr val="accent1"/>
+          </a:lnRef>
+          <a:fillRef idx="0">
+            <a:schemeClr val="accent1"/>
+          </a:fillRef>
+          <a:effectRef idx="0">
+            <a:schemeClr val="accent1"/>
+          </a:effectRef>
+          <a:fontRef idx="minor">
+            <a:schemeClr val="tx1"/>
+          </a:fontRef>
+        </p:style>
+      </p:cxnSp>
+      <p:sp>
+        <p:nvSpPr>
+          <p:cNvPr id="17" name="16 CuadroTexto"/>
+          <p:cNvSpPr txBox="1"/>
+          <p:nvPr/>
+        </p:nvSpPr>
+        <p:spPr>
+          <a:xfrm>
+            <a:off x="107504" y="2708920"/>
+            <a:ext cx="1080120" cy="369332"/>
+          </a:xfrm>
+          <a:prstGeom prst="rect">
+            <a:avLst/>
+          </a:prstGeom>
+          <a:noFill/>
+        </p:spPr>
+        <p:txBody>
+          <a:bodyPr wrap="square" rtlCol="0">
+            <a:spAutoFit/>
+          </a:bodyPr>
+          <a:lstStyle/>
+          <a:p>
+            <a:r>
+              <a:rPr lang="es-ES" dirty="0" smtClean="0"/>
+              <a:t>JSON</a:t>
+            </a:r>
+            <a:endParaRPr lang="es-ES" dirty="0"/>
+          </a:p>
+        </p:txBody>
+      </p:sp>
+      <p:sp>
+        <p:nvSpPr>
+          <p:cNvPr id="18" name="17 CuadroTexto"/>
+          <p:cNvSpPr txBox="1"/>
+          <p:nvPr/>
+        </p:nvSpPr>
+        <p:spPr>
+          <a:xfrm>
+            <a:off x="2195736" y="2204864"/>
+            <a:ext cx="1296144" cy="369332"/>
+          </a:xfrm>
+          <a:prstGeom prst="rect">
+            <a:avLst/>
+          </a:prstGeom>
+          <a:noFill/>
+        </p:spPr>
+        <p:txBody>
+          <a:bodyPr wrap="square" rtlCol="0">
+            <a:spAutoFit/>
+          </a:bodyPr>
+          <a:lstStyle/>
+          <a:p>
+            <a:r>
+              <a:rPr lang="es-ES" smtClean="0"/>
+              <a:t>DTOs</a:t>
+            </a:r>
+            <a:endParaRPr lang="es-ES" dirty="0"/>
+          </a:p>
+        </p:txBody>
+      </p:sp>
     </p:spTree>
   </p:cSld>
   <p:clrMapOvr>

</xml_diff>

<commit_message>
Nuevo ejercicio 12 con jwt
</commit_message>
<xml_diff>
--- a/pizarra.pptx
+++ b/pizarra.pptx
@@ -17,6 +17,8 @@
     <p:sldId id="265" r:id="rId11"/>
     <p:sldId id="266" r:id="rId12"/>
     <p:sldId id="267" r:id="rId13"/>
+    <p:sldId id="268" r:id="rId14"/>
+    <p:sldId id="269" r:id="rId15"/>
   </p:sldIdLst>
   <p:sldSz cx="9144000" cy="6858000" type="screen4x3"/>
   <p:notesSz cx="6858000" cy="9144000"/>
@@ -300,7 +302,7 @@
             <a:fld id="{7A847CFC-816F-41D0-AAC0-9BF4FEBC753E}" type="datetimeFigureOut">
               <a:rPr lang="es-ES" smtClean="0"/>
               <a:pPr/>
-              <a:t>09/06/2025</a:t>
+              <a:t>10/06/2025</a:t>
             </a:fld>
             <a:endParaRPr lang="es-ES"/>
           </a:p>
@@ -467,7 +469,7 @@
             <a:fld id="{7A847CFC-816F-41D0-AAC0-9BF4FEBC753E}" type="datetimeFigureOut">
               <a:rPr lang="es-ES" smtClean="0"/>
               <a:pPr/>
-              <a:t>09/06/2025</a:t>
+              <a:t>10/06/2025</a:t>
             </a:fld>
             <a:endParaRPr lang="es-ES"/>
           </a:p>
@@ -644,7 +646,7 @@
             <a:fld id="{7A847CFC-816F-41D0-AAC0-9BF4FEBC753E}" type="datetimeFigureOut">
               <a:rPr lang="es-ES" smtClean="0"/>
               <a:pPr/>
-              <a:t>09/06/2025</a:t>
+              <a:t>10/06/2025</a:t>
             </a:fld>
             <a:endParaRPr lang="es-ES"/>
           </a:p>
@@ -811,7 +813,7 @@
             <a:fld id="{7A847CFC-816F-41D0-AAC0-9BF4FEBC753E}" type="datetimeFigureOut">
               <a:rPr lang="es-ES" smtClean="0"/>
               <a:pPr/>
-              <a:t>09/06/2025</a:t>
+              <a:t>10/06/2025</a:t>
             </a:fld>
             <a:endParaRPr lang="es-ES"/>
           </a:p>
@@ -1054,7 +1056,7 @@
             <a:fld id="{7A847CFC-816F-41D0-AAC0-9BF4FEBC753E}" type="datetimeFigureOut">
               <a:rPr lang="es-ES" smtClean="0"/>
               <a:pPr/>
-              <a:t>09/06/2025</a:t>
+              <a:t>10/06/2025</a:t>
             </a:fld>
             <a:endParaRPr lang="es-ES"/>
           </a:p>
@@ -1339,7 +1341,7 @@
             <a:fld id="{7A847CFC-816F-41D0-AAC0-9BF4FEBC753E}" type="datetimeFigureOut">
               <a:rPr lang="es-ES" smtClean="0"/>
               <a:pPr/>
-              <a:t>09/06/2025</a:t>
+              <a:t>10/06/2025</a:t>
             </a:fld>
             <a:endParaRPr lang="es-ES"/>
           </a:p>
@@ -1758,7 +1760,7 @@
             <a:fld id="{7A847CFC-816F-41D0-AAC0-9BF4FEBC753E}" type="datetimeFigureOut">
               <a:rPr lang="es-ES" smtClean="0"/>
               <a:pPr/>
-              <a:t>09/06/2025</a:t>
+              <a:t>10/06/2025</a:t>
             </a:fld>
             <a:endParaRPr lang="es-ES"/>
           </a:p>
@@ -1873,7 +1875,7 @@
             <a:fld id="{7A847CFC-816F-41D0-AAC0-9BF4FEBC753E}" type="datetimeFigureOut">
               <a:rPr lang="es-ES" smtClean="0"/>
               <a:pPr/>
-              <a:t>09/06/2025</a:t>
+              <a:t>10/06/2025</a:t>
             </a:fld>
             <a:endParaRPr lang="es-ES"/>
           </a:p>
@@ -1965,7 +1967,7 @@
             <a:fld id="{7A847CFC-816F-41D0-AAC0-9BF4FEBC753E}" type="datetimeFigureOut">
               <a:rPr lang="es-ES" smtClean="0"/>
               <a:pPr/>
-              <a:t>09/06/2025</a:t>
+              <a:t>10/06/2025</a:t>
             </a:fld>
             <a:endParaRPr lang="es-ES"/>
           </a:p>
@@ -2239,7 +2241,7 @@
             <a:fld id="{7A847CFC-816F-41D0-AAC0-9BF4FEBC753E}" type="datetimeFigureOut">
               <a:rPr lang="es-ES" smtClean="0"/>
               <a:pPr/>
-              <a:t>09/06/2025</a:t>
+              <a:t>10/06/2025</a:t>
             </a:fld>
             <a:endParaRPr lang="es-ES"/>
           </a:p>
@@ -2489,7 +2491,7 @@
             <a:fld id="{7A847CFC-816F-41D0-AAC0-9BF4FEBC753E}" type="datetimeFigureOut">
               <a:rPr lang="es-ES" smtClean="0"/>
               <a:pPr/>
-              <a:t>09/06/2025</a:t>
+              <a:t>10/06/2025</a:t>
             </a:fld>
             <a:endParaRPr lang="es-ES"/>
           </a:p>
@@ -2699,7 +2701,7 @@
             <a:fld id="{7A847CFC-816F-41D0-AAC0-9BF4FEBC753E}" type="datetimeFigureOut">
               <a:rPr lang="es-ES" smtClean="0"/>
               <a:pPr/>
-              <a:t>09/06/2025</a:t>
+              <a:t>10/06/2025</a:t>
             </a:fld>
             <a:endParaRPr lang="es-ES"/>
           </a:p>
@@ -3878,11 +3880,7 @@
             </a:pPr>
             <a:r>
               <a:rPr lang="es-ES" dirty="0" smtClean="0"/>
-              <a:t>C</a:t>
-            </a:r>
-            <a:r>
-              <a:rPr lang="es-ES" dirty="0" smtClean="0"/>
-              <a:t>reación proyecto:</a:t>
+              <a:t>Creación proyecto:</a:t>
             </a:r>
           </a:p>
           <a:p>
@@ -4038,7 +4036,6 @@
               <a:rPr lang="es-ES" dirty="0" smtClean="0"/>
               <a:t> para documentar el servicio</a:t>
             </a:r>
-            <a:endParaRPr lang="es-ES" dirty="0" smtClean="0"/>
           </a:p>
           <a:p>
             <a:r>
@@ -4057,11 +4054,7 @@
           <a:p>
             <a:r>
               <a:rPr lang="es-ES" dirty="0" smtClean="0"/>
-              <a:t>	</a:t>
-            </a:r>
-            <a:r>
-              <a:rPr lang="es-ES" dirty="0" smtClean="0"/>
-              <a:t>.Registro de </a:t>
+              <a:t>	.Registro de </a:t>
             </a:r>
             <a:r>
               <a:rPr lang="es-ES" dirty="0" err="1" smtClean="0"/>
@@ -4086,12 +4079,631 @@
           <a:p>
             <a:r>
               <a:rPr lang="es-ES" dirty="0" smtClean="0"/>
-              <a:t>	</a:t>
-            </a:r>
+              <a:t>	.Acceso a variables de entorno para datos de conexión a base de datos</a:t>
+            </a:r>
+          </a:p>
+        </p:txBody>
+      </p:sp>
+    </p:spTree>
+  </p:cSld>
+  <p:clrMapOvr>
+    <a:masterClrMapping/>
+  </p:clrMapOvr>
+</p:sld>
+</file>
+
+<file path=ppt/slides/slide13.xml><?xml version="1.0" encoding="utf-8"?>
+<p:sld xmlns:a="http://schemas.openxmlformats.org/drawingml/2006/main" xmlns:r="http://schemas.openxmlformats.org/officeDocument/2006/relationships" xmlns:p="http://schemas.openxmlformats.org/presentationml/2006/main">
+  <p:cSld>
+    <p:spTree>
+      <p:nvGrpSpPr>
+        <p:cNvPr id="1" name=""/>
+        <p:cNvGrpSpPr/>
+        <p:nvPr/>
+      </p:nvGrpSpPr>
+      <p:grpSpPr>
+        <a:xfrm>
+          <a:off x="0" y="0"/>
+          <a:ext cx="0" cy="0"/>
+          <a:chOff x="0" y="0"/>
+          <a:chExt cx="0" cy="0"/>
+        </a:xfrm>
+      </p:grpSpPr>
+      <p:sp>
+        <p:nvSpPr>
+          <p:cNvPr id="2" name="1 Elipse"/>
+          <p:cNvSpPr/>
+          <p:nvPr/>
+        </p:nvSpPr>
+        <p:spPr>
+          <a:xfrm>
+            <a:off x="5292080" y="2348880"/>
+            <a:ext cx="1872208" cy="1080120"/>
+          </a:xfrm>
+          <a:prstGeom prst="ellipse">
+            <a:avLst/>
+          </a:prstGeom>
+        </p:spPr>
+        <p:style>
+          <a:lnRef idx="2">
+            <a:schemeClr val="accent1">
+              <a:shade val="50000"/>
+            </a:schemeClr>
+          </a:lnRef>
+          <a:fillRef idx="1">
+            <a:schemeClr val="accent1"/>
+          </a:fillRef>
+          <a:effectRef idx="0">
+            <a:schemeClr val="accent1"/>
+          </a:effectRef>
+          <a:fontRef idx="minor">
+            <a:schemeClr val="lt1"/>
+          </a:fontRef>
+        </p:style>
+        <p:txBody>
+          <a:bodyPr rtlCol="0" anchor="ctr"/>
+          <a:lstStyle/>
+          <a:p>
+            <a:pPr algn="ctr"/>
+            <a:endParaRPr lang="es-ES"/>
+          </a:p>
+        </p:txBody>
+      </p:sp>
+      <p:sp>
+        <p:nvSpPr>
+          <p:cNvPr id="3" name="2 CuadroTexto"/>
+          <p:cNvSpPr txBox="1"/>
+          <p:nvPr/>
+        </p:nvSpPr>
+        <p:spPr>
+          <a:xfrm>
+            <a:off x="5652120" y="2564904"/>
+            <a:ext cx="1152128" cy="646331"/>
+          </a:xfrm>
+          <a:prstGeom prst="rect">
+            <a:avLst/>
+          </a:prstGeom>
+          <a:noFill/>
+        </p:spPr>
+        <p:txBody>
+          <a:bodyPr wrap="square" rtlCol="0">
+            <a:spAutoFit/>
+          </a:bodyPr>
+          <a:lstStyle/>
+          <a:p>
+            <a:pPr algn="ctr"/>
             <a:r>
               <a:rPr lang="es-ES" dirty="0" smtClean="0"/>
-              <a:t>.Acceso a variables de entorno para datos de conexión a base de datos</a:t>
-            </a:r>
+              <a:t>servicio tienda</a:t>
+            </a:r>
+            <a:endParaRPr lang="es-ES" dirty="0"/>
+          </a:p>
+        </p:txBody>
+      </p:sp>
+      <p:sp>
+        <p:nvSpPr>
+          <p:cNvPr id="4" name="3 Disco magnético"/>
+          <p:cNvSpPr/>
+          <p:nvPr/>
+        </p:nvSpPr>
+        <p:spPr>
+          <a:xfrm>
+            <a:off x="7740352" y="2132856"/>
+            <a:ext cx="936104" cy="936104"/>
+          </a:xfrm>
+          <a:prstGeom prst="flowChartMagneticDisk">
+            <a:avLst/>
+          </a:prstGeom>
+          <a:noFill/>
+        </p:spPr>
+        <p:style>
+          <a:lnRef idx="2">
+            <a:schemeClr val="accent1">
+              <a:shade val="50000"/>
+            </a:schemeClr>
+          </a:lnRef>
+          <a:fillRef idx="1">
+            <a:schemeClr val="accent1"/>
+          </a:fillRef>
+          <a:effectRef idx="0">
+            <a:schemeClr val="accent1"/>
+          </a:effectRef>
+          <a:fontRef idx="minor">
+            <a:schemeClr val="lt1"/>
+          </a:fontRef>
+        </p:style>
+        <p:txBody>
+          <a:bodyPr rtlCol="0" anchor="ctr"/>
+          <a:lstStyle/>
+          <a:p>
+            <a:pPr algn="ctr"/>
+            <a:endParaRPr lang="es-ES"/>
+          </a:p>
+        </p:txBody>
+      </p:sp>
+      <p:sp>
+        <p:nvSpPr>
+          <p:cNvPr id="5" name="4 Nube"/>
+          <p:cNvSpPr/>
+          <p:nvPr/>
+        </p:nvSpPr>
+        <p:spPr>
+          <a:xfrm>
+            <a:off x="3779912" y="3068960"/>
+            <a:ext cx="1080120" cy="576064"/>
+          </a:xfrm>
+          <a:prstGeom prst="cloud">
+            <a:avLst/>
+          </a:prstGeom>
+        </p:spPr>
+        <p:style>
+          <a:lnRef idx="2">
+            <a:schemeClr val="accent1">
+              <a:shade val="50000"/>
+            </a:schemeClr>
+          </a:lnRef>
+          <a:fillRef idx="1">
+            <a:schemeClr val="accent1"/>
+          </a:fillRef>
+          <a:effectRef idx="0">
+            <a:schemeClr val="accent1"/>
+          </a:effectRef>
+          <a:fontRef idx="minor">
+            <a:schemeClr val="lt1"/>
+          </a:fontRef>
+        </p:style>
+        <p:txBody>
+          <a:bodyPr rtlCol="0" anchor="ctr"/>
+          <a:lstStyle/>
+          <a:p>
+            <a:pPr algn="ctr"/>
+            <a:endParaRPr lang="es-ES"/>
+          </a:p>
+        </p:txBody>
+      </p:sp>
+      <p:sp>
+        <p:nvSpPr>
+          <p:cNvPr id="6" name="5 Elipse"/>
+          <p:cNvSpPr/>
+          <p:nvPr/>
+        </p:nvSpPr>
+        <p:spPr>
+          <a:xfrm>
+            <a:off x="1619672" y="3645024"/>
+            <a:ext cx="1872208" cy="1080120"/>
+          </a:xfrm>
+          <a:prstGeom prst="ellipse">
+            <a:avLst/>
+          </a:prstGeom>
+        </p:spPr>
+        <p:style>
+          <a:lnRef idx="2">
+            <a:schemeClr val="accent1">
+              <a:shade val="50000"/>
+            </a:schemeClr>
+          </a:lnRef>
+          <a:fillRef idx="1">
+            <a:schemeClr val="accent1"/>
+          </a:fillRef>
+          <a:effectRef idx="0">
+            <a:schemeClr val="accent1"/>
+          </a:effectRef>
+          <a:fontRef idx="minor">
+            <a:schemeClr val="lt1"/>
+          </a:fontRef>
+        </p:style>
+        <p:txBody>
+          <a:bodyPr rtlCol="0" anchor="ctr"/>
+          <a:lstStyle/>
+          <a:p>
+            <a:pPr algn="ctr"/>
+            <a:endParaRPr lang="es-ES"/>
+          </a:p>
+        </p:txBody>
+      </p:sp>
+      <p:sp>
+        <p:nvSpPr>
+          <p:cNvPr id="7" name="6 CuadroTexto"/>
+          <p:cNvSpPr txBox="1"/>
+          <p:nvPr/>
+        </p:nvSpPr>
+        <p:spPr>
+          <a:xfrm>
+            <a:off x="1979712" y="3861048"/>
+            <a:ext cx="1152128" cy="646331"/>
+          </a:xfrm>
+          <a:prstGeom prst="rect">
+            <a:avLst/>
+          </a:prstGeom>
+          <a:noFill/>
+        </p:spPr>
+        <p:txBody>
+          <a:bodyPr wrap="square" rtlCol="0">
+            <a:spAutoFit/>
+          </a:bodyPr>
+          <a:lstStyle/>
+          <a:p>
+            <a:pPr algn="ctr"/>
+            <a:r>
+              <a:rPr lang="es-ES" dirty="0" smtClean="0"/>
+              <a:t>servicio compras</a:t>
+            </a:r>
+            <a:endParaRPr lang="es-ES" dirty="0"/>
+          </a:p>
+        </p:txBody>
+      </p:sp>
+      <p:sp>
+        <p:nvSpPr>
+          <p:cNvPr id="8" name="7 Forma libre"/>
+          <p:cNvSpPr/>
+          <p:nvPr/>
+        </p:nvSpPr>
+        <p:spPr>
+          <a:xfrm>
+            <a:off x="3062377" y="2687128"/>
+            <a:ext cx="2268748" cy="1039483"/>
+          </a:xfrm>
+          <a:custGeom>
+            <a:avLst/>
+            <a:gdLst>
+              <a:gd name="connsiteX0" fmla="*/ 0 w 2268748"/>
+              <a:gd name="connsiteY0" fmla="*/ 1039483 h 1039483"/>
+              <a:gd name="connsiteX1" fmla="*/ 957532 w 2268748"/>
+              <a:gd name="connsiteY1" fmla="*/ 168215 h 1039483"/>
+              <a:gd name="connsiteX2" fmla="*/ 2268748 w 2268748"/>
+              <a:gd name="connsiteY2" fmla="*/ 30193 h 1039483"/>
+            </a:gdLst>
+            <a:ahLst/>
+            <a:cxnLst>
+              <a:cxn ang="0">
+                <a:pos x="connsiteX0" y="connsiteY0"/>
+              </a:cxn>
+              <a:cxn ang="0">
+                <a:pos x="connsiteX1" y="connsiteY1"/>
+              </a:cxn>
+              <a:cxn ang="0">
+                <a:pos x="connsiteX2" y="connsiteY2"/>
+              </a:cxn>
+            </a:cxnLst>
+            <a:rect l="l" t="t" r="r" b="b"/>
+            <a:pathLst>
+              <a:path w="2268748" h="1039483">
+                <a:moveTo>
+                  <a:pt x="0" y="1039483"/>
+                </a:moveTo>
+                <a:cubicBezTo>
+                  <a:pt x="289703" y="687956"/>
+                  <a:pt x="579407" y="336430"/>
+                  <a:pt x="957532" y="168215"/>
+                </a:cubicBezTo>
+                <a:cubicBezTo>
+                  <a:pt x="1335657" y="0"/>
+                  <a:pt x="1802202" y="15096"/>
+                  <a:pt x="2268748" y="30193"/>
+                </a:cubicBezTo>
+              </a:path>
+            </a:pathLst>
+          </a:custGeom>
+          <a:ln>
+            <a:tailEnd type="triangle"/>
+          </a:ln>
+        </p:spPr>
+        <p:style>
+          <a:lnRef idx="1">
+            <a:schemeClr val="accent1"/>
+          </a:lnRef>
+          <a:fillRef idx="0">
+            <a:schemeClr val="accent1"/>
+          </a:fillRef>
+          <a:effectRef idx="0">
+            <a:schemeClr val="accent1"/>
+          </a:effectRef>
+          <a:fontRef idx="minor">
+            <a:schemeClr val="tx1"/>
+          </a:fontRef>
+        </p:style>
+        <p:txBody>
+          <a:bodyPr rtlCol="0" anchor="ctr"/>
+          <a:lstStyle/>
+          <a:p>
+            <a:pPr algn="ctr"/>
+            <a:endParaRPr lang="es-ES"/>
+          </a:p>
+        </p:txBody>
+      </p:sp>
+      <p:sp>
+        <p:nvSpPr>
+          <p:cNvPr id="9" name="8 Forma libre"/>
+          <p:cNvSpPr/>
+          <p:nvPr/>
+        </p:nvSpPr>
+        <p:spPr>
+          <a:xfrm>
+            <a:off x="3476445" y="3019245"/>
+            <a:ext cx="1811547" cy="1130061"/>
+          </a:xfrm>
+          <a:custGeom>
+            <a:avLst/>
+            <a:gdLst>
+              <a:gd name="connsiteX0" fmla="*/ 1811547 w 1811547"/>
+              <a:gd name="connsiteY0" fmla="*/ 0 h 1130061"/>
+              <a:gd name="connsiteX1" fmla="*/ 1311215 w 1811547"/>
+              <a:gd name="connsiteY1" fmla="*/ 690113 h 1130061"/>
+              <a:gd name="connsiteX2" fmla="*/ 0 w 1811547"/>
+              <a:gd name="connsiteY2" fmla="*/ 1130061 h 1130061"/>
+            </a:gdLst>
+            <a:ahLst/>
+            <a:cxnLst>
+              <a:cxn ang="0">
+                <a:pos x="connsiteX0" y="connsiteY0"/>
+              </a:cxn>
+              <a:cxn ang="0">
+                <a:pos x="connsiteX1" y="connsiteY1"/>
+              </a:cxn>
+              <a:cxn ang="0">
+                <a:pos x="connsiteX2" y="connsiteY2"/>
+              </a:cxn>
+            </a:cxnLst>
+            <a:rect l="l" t="t" r="r" b="b"/>
+            <a:pathLst>
+              <a:path w="1811547" h="1130061">
+                <a:moveTo>
+                  <a:pt x="1811547" y="0"/>
+                </a:moveTo>
+                <a:cubicBezTo>
+                  <a:pt x="1712343" y="250885"/>
+                  <a:pt x="1613140" y="501770"/>
+                  <a:pt x="1311215" y="690113"/>
+                </a:cubicBezTo>
+                <a:cubicBezTo>
+                  <a:pt x="1009291" y="878457"/>
+                  <a:pt x="504645" y="1004259"/>
+                  <a:pt x="0" y="1130061"/>
+                </a:cubicBezTo>
+              </a:path>
+            </a:pathLst>
+          </a:custGeom>
+          <a:ln>
+            <a:tailEnd type="triangle"/>
+          </a:ln>
+        </p:spPr>
+        <p:style>
+          <a:lnRef idx="1">
+            <a:schemeClr val="accent1"/>
+          </a:lnRef>
+          <a:fillRef idx="0">
+            <a:schemeClr val="accent1"/>
+          </a:fillRef>
+          <a:effectRef idx="0">
+            <a:schemeClr val="accent1"/>
+          </a:effectRef>
+          <a:fontRef idx="minor">
+            <a:schemeClr val="tx1"/>
+          </a:fontRef>
+        </p:style>
+        <p:txBody>
+          <a:bodyPr rtlCol="0" anchor="ctr"/>
+          <a:lstStyle/>
+          <a:p>
+            <a:pPr algn="ctr"/>
+            <a:endParaRPr lang="es-ES"/>
+          </a:p>
+        </p:txBody>
+      </p:sp>
+      <p:cxnSp>
+        <p:nvCxnSpPr>
+          <p:cNvPr id="11" name="10 Conector recto de flecha"/>
+          <p:cNvCxnSpPr/>
+          <p:nvPr/>
+        </p:nvCxnSpPr>
+        <p:spPr>
+          <a:xfrm flipV="1">
+            <a:off x="827584" y="4293096"/>
+            <a:ext cx="792088" cy="504056"/>
+          </a:xfrm>
+          <a:prstGeom prst="straightConnector1">
+            <a:avLst/>
+          </a:prstGeom>
+          <a:ln>
+            <a:tailEnd type="arrow"/>
+          </a:ln>
+        </p:spPr>
+        <p:style>
+          <a:lnRef idx="1">
+            <a:schemeClr val="accent1"/>
+          </a:lnRef>
+          <a:fillRef idx="0">
+            <a:schemeClr val="accent1"/>
+          </a:fillRef>
+          <a:effectRef idx="0">
+            <a:schemeClr val="accent1"/>
+          </a:effectRef>
+          <a:fontRef idx="minor">
+            <a:schemeClr val="tx1"/>
+          </a:fontRef>
+        </p:style>
+      </p:cxnSp>
+      <p:cxnSp>
+        <p:nvCxnSpPr>
+          <p:cNvPr id="13" name="12 Conector recto de flecha"/>
+          <p:cNvCxnSpPr/>
+          <p:nvPr/>
+        </p:nvCxnSpPr>
+        <p:spPr>
+          <a:xfrm flipV="1">
+            <a:off x="1547664" y="4725144"/>
+            <a:ext cx="648072" cy="576064"/>
+          </a:xfrm>
+          <a:prstGeom prst="straightConnector1">
+            <a:avLst/>
+          </a:prstGeom>
+          <a:ln>
+            <a:tailEnd type="arrow"/>
+          </a:ln>
+        </p:spPr>
+        <p:style>
+          <a:lnRef idx="1">
+            <a:schemeClr val="accent1"/>
+          </a:lnRef>
+          <a:fillRef idx="0">
+            <a:schemeClr val="accent1"/>
+          </a:fillRef>
+          <a:effectRef idx="0">
+            <a:schemeClr val="accent1"/>
+          </a:effectRef>
+          <a:fontRef idx="minor">
+            <a:schemeClr val="tx1"/>
+          </a:fontRef>
+        </p:style>
+      </p:cxnSp>
+    </p:spTree>
+  </p:cSld>
+  <p:clrMapOvr>
+    <a:masterClrMapping/>
+  </p:clrMapOvr>
+</p:sld>
+</file>
+
+<file path=ppt/slides/slide14.xml><?xml version="1.0" encoding="utf-8"?>
+<p:sld xmlns:a="http://schemas.openxmlformats.org/drawingml/2006/main" xmlns:r="http://schemas.openxmlformats.org/officeDocument/2006/relationships" xmlns:p="http://schemas.openxmlformats.org/presentationml/2006/main">
+  <p:cSld>
+    <p:spTree>
+      <p:nvGrpSpPr>
+        <p:cNvPr id="1" name=""/>
+        <p:cNvGrpSpPr/>
+        <p:nvPr/>
+      </p:nvGrpSpPr>
+      <p:grpSpPr>
+        <a:xfrm>
+          <a:off x="0" y="0"/>
+          <a:ext cx="0" cy="0"/>
+          <a:chOff x="0" y="0"/>
+          <a:chExt cx="0" cy="0"/>
+        </a:xfrm>
+      </p:grpSpPr>
+      <p:sp>
+        <p:nvSpPr>
+          <p:cNvPr id="2" name="1 CuadroTexto"/>
+          <p:cNvSpPr txBox="1"/>
+          <p:nvPr/>
+        </p:nvSpPr>
+        <p:spPr>
+          <a:xfrm>
+            <a:off x="1115616" y="476672"/>
+            <a:ext cx="5688632" cy="646331"/>
+          </a:xfrm>
+          <a:prstGeom prst="rect">
+            <a:avLst/>
+          </a:prstGeom>
+          <a:noFill/>
+        </p:spPr>
+        <p:txBody>
+          <a:bodyPr wrap="square" rtlCol="0">
+            <a:spAutoFit/>
+          </a:bodyPr>
+          <a:lstStyle/>
+          <a:p>
+            <a:r>
+              <a:rPr lang="es-ES" sz="3600" dirty="0" smtClean="0"/>
+              <a:t>Servicio de compras</a:t>
+            </a:r>
+            <a:endParaRPr lang="es-ES" sz="3600" dirty="0"/>
+          </a:p>
+        </p:txBody>
+      </p:sp>
+      <p:sp>
+        <p:nvSpPr>
+          <p:cNvPr id="3" name="2 CuadroTexto"/>
+          <p:cNvSpPr txBox="1"/>
+          <p:nvPr/>
+        </p:nvSpPr>
+        <p:spPr>
+          <a:xfrm>
+            <a:off x="899592" y="1772816"/>
+            <a:ext cx="6624736" cy="1754326"/>
+          </a:xfrm>
+          <a:prstGeom prst="rect">
+            <a:avLst/>
+          </a:prstGeom>
+          <a:noFill/>
+        </p:spPr>
+        <p:txBody>
+          <a:bodyPr wrap="square" rtlCol="0">
+            <a:spAutoFit/>
+          </a:bodyPr>
+          <a:lstStyle/>
+          <a:p>
+            <a:r>
+              <a:rPr lang="es-ES" dirty="0" smtClean="0"/>
+              <a:t>-</a:t>
+            </a:r>
+            <a:r>
+              <a:rPr lang="es-ES" b="1" dirty="0" smtClean="0"/>
+              <a:t>productos por rango de precios</a:t>
+            </a:r>
+            <a:r>
+              <a:rPr lang="es-ES" dirty="0" smtClean="0"/>
+              <a:t>. Recibe precio máximo y precio mínimo y devuelve la lista de productos* cuyo precio unitario esté en ese rango. </a:t>
+            </a:r>
+          </a:p>
+          <a:p>
+            <a:r>
+              <a:rPr lang="es-ES" dirty="0" smtClean="0"/>
+              <a:t>-</a:t>
+            </a:r>
+            <a:r>
+              <a:rPr lang="es-ES" b="1" dirty="0" smtClean="0"/>
+              <a:t>nuevo pedido</a:t>
+            </a:r>
+            <a:r>
+              <a:rPr lang="es-ES" dirty="0" smtClean="0"/>
+              <a:t>. Recibe un JSON con los datos del pedido que quiere realizar (nombre y unidades del producto). Si falla el pedido, informa con 409 al cliente</a:t>
+            </a:r>
+            <a:endParaRPr lang="es-ES" dirty="0"/>
+          </a:p>
+        </p:txBody>
+      </p:sp>
+      <p:sp>
+        <p:nvSpPr>
+          <p:cNvPr id="4" name="3 CuadroTexto"/>
+          <p:cNvSpPr txBox="1"/>
+          <p:nvPr/>
+        </p:nvSpPr>
+        <p:spPr>
+          <a:xfrm>
+            <a:off x="1043608" y="4221088"/>
+            <a:ext cx="6696744" cy="1200329"/>
+          </a:xfrm>
+          <a:prstGeom prst="rect">
+            <a:avLst/>
+          </a:prstGeom>
+          <a:noFill/>
+        </p:spPr>
+        <p:txBody>
+          <a:bodyPr wrap="square" rtlCol="0">
+            <a:spAutoFit/>
+          </a:bodyPr>
+          <a:lstStyle/>
+          <a:p>
+            <a:r>
+              <a:rPr lang="es-ES" dirty="0" smtClean="0"/>
+              <a:t>*Los datos de un producto son: </a:t>
+            </a:r>
+            <a:r>
+              <a:rPr lang="es-ES" dirty="0" err="1" smtClean="0"/>
+              <a:t>nombre,precio,disponibilidad</a:t>
+            </a:r>
+            <a:endParaRPr lang="es-ES" dirty="0" smtClean="0"/>
+          </a:p>
+          <a:p>
+            <a:endParaRPr lang="es-ES" dirty="0" smtClean="0"/>
+          </a:p>
+          <a:p>
+            <a:r>
+              <a:rPr lang="es-ES" dirty="0" smtClean="0"/>
+              <a:t>La disponibilidad depende del stock: entre 0 y 3 baja, de 4 a 10 media, más de 10 alta. </a:t>
+            </a:r>
+            <a:endParaRPr lang="es-ES" dirty="0"/>
           </a:p>
         </p:txBody>
       </p:sp>

</xml_diff>